<commit_message>
prepared end points for some functions
</commit_message>
<xml_diff>
--- a/doc/Function Hierarchy.pptx
+++ b/doc/Function Hierarchy.pptx
@@ -1184,10 +1184,24 @@
     <dgm:pt modelId="{E2EE1F9B-72E8-4DB3-BAFC-A45061F0178A}" type="parTrans" cxnId="{39D1933C-AC0D-4A19-8967-23D3273626B8}">
       <dgm:prSet/>
       <dgm:spPr/>
+      <dgm:t>
+        <a:bodyPr/>
+        <a:lstStyle/>
+        <a:p>
+          <a:endParaRPr lang="de-DE"/>
+        </a:p>
+      </dgm:t>
     </dgm:pt>
     <dgm:pt modelId="{443018FF-26AA-49F0-8355-EF19CDF386BA}" type="sibTrans" cxnId="{39D1933C-AC0D-4A19-8967-23D3273626B8}">
       <dgm:prSet/>
       <dgm:spPr/>
+      <dgm:t>
+        <a:bodyPr/>
+        <a:lstStyle/>
+        <a:p>
+          <a:endParaRPr lang="de-DE"/>
+        </a:p>
+      </dgm:t>
     </dgm:pt>
     <dgm:pt modelId="{53B3501B-D7C1-4FA5-82A0-8B68726C2A70}">
       <dgm:prSet phldrT="[Text]"/>
@@ -1206,10 +1220,24 @@
     <dgm:pt modelId="{CFAFB6E5-0F76-4FC4-BA8A-E84684538208}" type="parTrans" cxnId="{245AF684-0789-4A93-AD95-0F28550DC846}">
       <dgm:prSet/>
       <dgm:spPr/>
+      <dgm:t>
+        <a:bodyPr/>
+        <a:lstStyle/>
+        <a:p>
+          <a:endParaRPr lang="de-DE"/>
+        </a:p>
+      </dgm:t>
     </dgm:pt>
     <dgm:pt modelId="{F00BFC95-C6AA-4913-8740-DE8F3637DDBC}" type="sibTrans" cxnId="{245AF684-0789-4A93-AD95-0F28550DC846}">
       <dgm:prSet/>
       <dgm:spPr/>
+      <dgm:t>
+        <a:bodyPr/>
+        <a:lstStyle/>
+        <a:p>
+          <a:endParaRPr lang="de-DE"/>
+        </a:p>
+      </dgm:t>
     </dgm:pt>
     <dgm:pt modelId="{EBAD62C2-1A59-4220-BA35-7FDD8A722DF8}">
       <dgm:prSet phldrT="[Text]"/>
@@ -1233,10 +1261,24 @@
     <dgm:pt modelId="{51BF98EF-3EB6-4FFC-891C-E56C8FF2AF17}" type="parTrans" cxnId="{A4831F8C-5A47-477F-867D-C43A17F4DD5F}">
       <dgm:prSet/>
       <dgm:spPr/>
+      <dgm:t>
+        <a:bodyPr/>
+        <a:lstStyle/>
+        <a:p>
+          <a:endParaRPr lang="de-DE"/>
+        </a:p>
+      </dgm:t>
     </dgm:pt>
     <dgm:pt modelId="{D01F124E-784B-48F1-8D2D-44102E52B659}" type="sibTrans" cxnId="{A4831F8C-5A47-477F-867D-C43A17F4DD5F}">
       <dgm:prSet/>
       <dgm:spPr/>
+      <dgm:t>
+        <a:bodyPr/>
+        <a:lstStyle/>
+        <a:p>
+          <a:endParaRPr lang="de-DE"/>
+        </a:p>
+      </dgm:t>
     </dgm:pt>
     <dgm:pt modelId="{2A344502-64AF-4402-875A-4A0DC2775C80}">
       <dgm:prSet phldrT="[Text]"/>
@@ -1255,10 +1297,24 @@
     <dgm:pt modelId="{BD49D998-0A2D-4855-863D-7F7F819C480B}" type="parTrans" cxnId="{4290EB81-C5D6-4257-B441-05A5CC9152E3}">
       <dgm:prSet/>
       <dgm:spPr/>
+      <dgm:t>
+        <a:bodyPr/>
+        <a:lstStyle/>
+        <a:p>
+          <a:endParaRPr lang="de-DE"/>
+        </a:p>
+      </dgm:t>
     </dgm:pt>
     <dgm:pt modelId="{1C2BF478-2410-47F2-B60A-29C456D15825}" type="sibTrans" cxnId="{4290EB81-C5D6-4257-B441-05A5CC9152E3}">
       <dgm:prSet/>
       <dgm:spPr/>
+      <dgm:t>
+        <a:bodyPr/>
+        <a:lstStyle/>
+        <a:p>
+          <a:endParaRPr lang="de-DE"/>
+        </a:p>
+      </dgm:t>
     </dgm:pt>
     <dgm:pt modelId="{0DE6765B-2DB4-45A7-83E0-08B1E4602B57}">
       <dgm:prSet phldrT="[Text]"/>
@@ -1285,10 +1341,24 @@
     <dgm:pt modelId="{D85DF57F-C431-4266-93BA-2918140ADAED}" type="parTrans" cxnId="{3D107FC7-4B25-4081-812D-E89CE70F0DB3}">
       <dgm:prSet/>
       <dgm:spPr/>
+      <dgm:t>
+        <a:bodyPr/>
+        <a:lstStyle/>
+        <a:p>
+          <a:endParaRPr lang="de-DE"/>
+        </a:p>
+      </dgm:t>
     </dgm:pt>
     <dgm:pt modelId="{46E43563-55EA-46CB-A941-296D20EAA8A3}" type="sibTrans" cxnId="{3D107FC7-4B25-4081-812D-E89CE70F0DB3}">
       <dgm:prSet/>
       <dgm:spPr/>
+      <dgm:t>
+        <a:bodyPr/>
+        <a:lstStyle/>
+        <a:p>
+          <a:endParaRPr lang="de-DE"/>
+        </a:p>
+      </dgm:t>
     </dgm:pt>
     <dgm:pt modelId="{A231A93F-201C-4772-8931-7BFDBF09EDA5}">
       <dgm:prSet phldrT="[Text]"/>
@@ -1312,10 +1382,24 @@
     <dgm:pt modelId="{25275D89-D994-43C3-8969-45719DF0AE1B}" type="parTrans" cxnId="{C04DB956-3B74-4A0A-B5B6-0217627F6143}">
       <dgm:prSet/>
       <dgm:spPr/>
+      <dgm:t>
+        <a:bodyPr/>
+        <a:lstStyle/>
+        <a:p>
+          <a:endParaRPr lang="de-DE"/>
+        </a:p>
+      </dgm:t>
     </dgm:pt>
     <dgm:pt modelId="{7A063EE6-CACD-4B95-844B-008C220E5750}" type="sibTrans" cxnId="{C04DB956-3B74-4A0A-B5B6-0217627F6143}">
       <dgm:prSet/>
       <dgm:spPr/>
+      <dgm:t>
+        <a:bodyPr/>
+        <a:lstStyle/>
+        <a:p>
+          <a:endParaRPr lang="de-DE"/>
+        </a:p>
+      </dgm:t>
     </dgm:pt>
     <dgm:pt modelId="{3FDA13BB-5CEF-4BE9-9681-56895241E193}">
       <dgm:prSet phldrT="[Text]"/>
@@ -1338,23 +1422,143 @@
           </a:r>
           <a:r>
             <a:rPr lang="de-DE" dirty="0"/>
-            <a:t> vs. </a:t>
+            <a:t> vs. Permission</a:t>
           </a:r>
-          <a:r>
-            <a:rPr lang="de-DE" dirty="0" err="1"/>
-            <a:t>permission</a:t>
-          </a:r>
-          <a:endParaRPr lang="de-DE" dirty="0"/>
         </a:p>
       </dgm:t>
     </dgm:pt>
     <dgm:pt modelId="{848CAA27-57F9-49C5-8EA8-9ADEC1464C53}" type="parTrans" cxnId="{475BB76E-453D-4312-9E11-A64F489284FD}">
       <dgm:prSet/>
       <dgm:spPr/>
+      <dgm:t>
+        <a:bodyPr/>
+        <a:lstStyle/>
+        <a:p>
+          <a:endParaRPr lang="de-DE"/>
+        </a:p>
+      </dgm:t>
     </dgm:pt>
     <dgm:pt modelId="{9732F404-7F81-4A33-9C8C-023D2488D5FA}" type="sibTrans" cxnId="{475BB76E-453D-4312-9E11-A64F489284FD}">
       <dgm:prSet/>
       <dgm:spPr/>
+      <dgm:t>
+        <a:bodyPr/>
+        <a:lstStyle/>
+        <a:p>
+          <a:endParaRPr lang="de-DE"/>
+        </a:p>
+      </dgm:t>
+    </dgm:pt>
+    <dgm:pt modelId="{003EA300-936D-4F79-9145-DF4C96569D6A}">
+      <dgm:prSet phldrT="[Text]"/>
+      <dgm:spPr/>
+      <dgm:t>
+        <a:bodyPr/>
+        <a:lstStyle/>
+        <a:p>
+          <a:r>
+            <a:rPr lang="de-DE"/>
+            <a:t>Get Users</a:t>
+          </a:r>
+          <a:endParaRPr lang="de-DE" dirty="0"/>
+        </a:p>
+      </dgm:t>
+    </dgm:pt>
+    <dgm:pt modelId="{A238B559-DCAD-41A0-A740-8F51CDDE6379}" type="parTrans" cxnId="{957B2AFD-ECDC-4F5F-9DD0-16B86D9D42EC}">
+      <dgm:prSet/>
+      <dgm:spPr/>
+      <dgm:t>
+        <a:bodyPr/>
+        <a:lstStyle/>
+        <a:p>
+          <a:endParaRPr lang="de-DE"/>
+        </a:p>
+      </dgm:t>
+    </dgm:pt>
+    <dgm:pt modelId="{10936D95-45B3-4E18-A423-4B211891C7BF}" type="sibTrans" cxnId="{957B2AFD-ECDC-4F5F-9DD0-16B86D9D42EC}">
+      <dgm:prSet/>
+      <dgm:spPr/>
+      <dgm:t>
+        <a:bodyPr/>
+        <a:lstStyle/>
+        <a:p>
+          <a:endParaRPr lang="de-DE"/>
+        </a:p>
+      </dgm:t>
+    </dgm:pt>
+    <dgm:pt modelId="{5860AA6A-3923-4FF3-8650-F12DE7A16B33}">
+      <dgm:prSet phldrT="[Text]"/>
+      <dgm:spPr/>
+      <dgm:t>
+        <a:bodyPr/>
+        <a:lstStyle/>
+        <a:p>
+          <a:r>
+            <a:rPr lang="de-DE"/>
+            <a:t>Get Roles</a:t>
+          </a:r>
+          <a:endParaRPr lang="de-DE" dirty="0"/>
+        </a:p>
+      </dgm:t>
+    </dgm:pt>
+    <dgm:pt modelId="{16E98EEA-00D7-4A33-96C8-08620AA9A2F4}" type="parTrans" cxnId="{0EFF502E-EF9F-4636-BCB2-311C2EFBA7DA}">
+      <dgm:prSet/>
+      <dgm:spPr/>
+      <dgm:t>
+        <a:bodyPr/>
+        <a:lstStyle/>
+        <a:p>
+          <a:endParaRPr lang="de-DE"/>
+        </a:p>
+      </dgm:t>
+    </dgm:pt>
+    <dgm:pt modelId="{C0F1F837-0E57-4295-B4A7-7FA538451E6E}" type="sibTrans" cxnId="{0EFF502E-EF9F-4636-BCB2-311C2EFBA7DA}">
+      <dgm:prSet/>
+      <dgm:spPr/>
+      <dgm:t>
+        <a:bodyPr/>
+        <a:lstStyle/>
+        <a:p>
+          <a:endParaRPr lang="de-DE"/>
+        </a:p>
+      </dgm:t>
+    </dgm:pt>
+    <dgm:pt modelId="{50875F28-2D52-4C6F-8BF7-791007AC6A99}">
+      <dgm:prSet phldrT="[Text]"/>
+      <dgm:spPr/>
+      <dgm:t>
+        <a:bodyPr/>
+        <a:lstStyle/>
+        <a:p>
+          <a:r>
+            <a:rPr lang="de-DE"/>
+            <a:t>Get Permissions</a:t>
+          </a:r>
+          <a:endParaRPr lang="de-DE" dirty="0"/>
+        </a:p>
+      </dgm:t>
+    </dgm:pt>
+    <dgm:pt modelId="{ABC52B77-F469-4A41-A71F-5ABAE99246CB}" type="parTrans" cxnId="{55B5BAE7-6F3A-469A-B448-649A9DED2A9D}">
+      <dgm:prSet/>
+      <dgm:spPr/>
+      <dgm:t>
+        <a:bodyPr/>
+        <a:lstStyle/>
+        <a:p>
+          <a:endParaRPr lang="de-DE"/>
+        </a:p>
+      </dgm:t>
+    </dgm:pt>
+    <dgm:pt modelId="{DE508627-5A6B-48F2-830B-EDFE9358B7EC}" type="sibTrans" cxnId="{55B5BAE7-6F3A-469A-B448-649A9DED2A9D}">
+      <dgm:prSet/>
+      <dgm:spPr/>
+      <dgm:t>
+        <a:bodyPr/>
+        <a:lstStyle/>
+        <a:p>
+          <a:endParaRPr lang="de-DE"/>
+        </a:p>
+      </dgm:t>
     </dgm:pt>
     <dgm:pt modelId="{D4A4ADBC-B040-4719-938C-99640A53EC84}" type="pres">
       <dgm:prSet presAssocID="{E2889C1D-D96E-4F74-AAA1-C39A76FF760E}" presName="diagram" presStyleCnt="0">
@@ -1389,11 +1593,11 @@
       <dgm:spPr/>
     </dgm:pt>
     <dgm:pt modelId="{A3390386-4FD8-4AFD-92F2-41DB4B93F24F}" type="pres">
-      <dgm:prSet presAssocID="{630F68DB-25CE-4283-B054-FD78FAADF1FF}" presName="Name13" presStyleLbl="parChTrans1D2" presStyleIdx="0" presStyleCnt="11"/>
+      <dgm:prSet presAssocID="{630F68DB-25CE-4283-B054-FD78FAADF1FF}" presName="Name13" presStyleLbl="parChTrans1D2" presStyleIdx="0" presStyleCnt="14"/>
       <dgm:spPr/>
     </dgm:pt>
     <dgm:pt modelId="{7045ACD6-9CD0-4504-BAAC-671A0F558409}" type="pres">
-      <dgm:prSet presAssocID="{011E2DB7-EE10-49E0-AFA2-9CDC0813BA16}" presName="childText" presStyleLbl="bgAcc1" presStyleIdx="0" presStyleCnt="11">
+      <dgm:prSet presAssocID="{011E2DB7-EE10-49E0-AFA2-9CDC0813BA16}" presName="childText" presStyleLbl="bgAcc1" presStyleIdx="0" presStyleCnt="14">
         <dgm:presLayoutVars>
           <dgm:bulletEnabled val="1"/>
         </dgm:presLayoutVars>
@@ -1401,11 +1605,11 @@
       <dgm:spPr/>
     </dgm:pt>
     <dgm:pt modelId="{3D429404-7F59-4FA7-9170-D8CD3E73363F}" type="pres">
-      <dgm:prSet presAssocID="{916784B3-2EFD-4233-AB8A-50772124D55B}" presName="Name13" presStyleLbl="parChTrans1D2" presStyleIdx="1" presStyleCnt="11"/>
+      <dgm:prSet presAssocID="{916784B3-2EFD-4233-AB8A-50772124D55B}" presName="Name13" presStyleLbl="parChTrans1D2" presStyleIdx="1" presStyleCnt="14"/>
       <dgm:spPr/>
     </dgm:pt>
     <dgm:pt modelId="{8141A459-6AF2-4F83-90FF-8F55BE342AA8}" type="pres">
-      <dgm:prSet presAssocID="{6D0DE337-A52D-462D-B74A-B488B5F33C4A}" presName="childText" presStyleLbl="bgAcc1" presStyleIdx="1" presStyleCnt="11">
+      <dgm:prSet presAssocID="{6D0DE337-A52D-462D-B74A-B488B5F33C4A}" presName="childText" presStyleLbl="bgAcc1" presStyleIdx="1" presStyleCnt="14">
         <dgm:presLayoutVars>
           <dgm:bulletEnabled val="1"/>
         </dgm:presLayoutVars>
@@ -1433,11 +1637,11 @@
       <dgm:spPr/>
     </dgm:pt>
     <dgm:pt modelId="{8A6F4C9C-712D-48F9-82BE-2C20CCADC8F6}" type="pres">
-      <dgm:prSet presAssocID="{0B1BAE2A-A7C4-44A4-AC22-D4399D75B273}" presName="Name13" presStyleLbl="parChTrans1D2" presStyleIdx="2" presStyleCnt="11"/>
+      <dgm:prSet presAssocID="{0B1BAE2A-A7C4-44A4-AC22-D4399D75B273}" presName="Name13" presStyleLbl="parChTrans1D2" presStyleIdx="2" presStyleCnt="14"/>
       <dgm:spPr/>
     </dgm:pt>
     <dgm:pt modelId="{04CAEDEE-4506-4EA3-A5B9-F7FE18C94C0D}" type="pres">
-      <dgm:prSet presAssocID="{EF20AD18-7E88-4D56-876D-5C1D2A454F6D}" presName="childText" presStyleLbl="bgAcc1" presStyleIdx="2" presStyleCnt="11">
+      <dgm:prSet presAssocID="{EF20AD18-7E88-4D56-876D-5C1D2A454F6D}" presName="childText" presStyleLbl="bgAcc1" presStyleIdx="2" presStyleCnt="14">
         <dgm:presLayoutVars>
           <dgm:bulletEnabled val="1"/>
         </dgm:presLayoutVars>
@@ -1445,11 +1649,11 @@
       <dgm:spPr/>
     </dgm:pt>
     <dgm:pt modelId="{B14A8BBB-FE6E-4D8B-80B3-357B456E60DF}" type="pres">
-      <dgm:prSet presAssocID="{39A951B0-4451-493F-A724-C4865820AF8E}" presName="Name13" presStyleLbl="parChTrans1D2" presStyleIdx="3" presStyleCnt="11"/>
+      <dgm:prSet presAssocID="{39A951B0-4451-493F-A724-C4865820AF8E}" presName="Name13" presStyleLbl="parChTrans1D2" presStyleIdx="3" presStyleCnt="14"/>
       <dgm:spPr/>
     </dgm:pt>
     <dgm:pt modelId="{A5D71206-83BE-4FE7-9DE2-D60A9F51C7C1}" type="pres">
-      <dgm:prSet presAssocID="{DA73446B-A422-4326-A348-B0DE7DD44A86}" presName="childText" presStyleLbl="bgAcc1" presStyleIdx="3" presStyleCnt="11">
+      <dgm:prSet presAssocID="{DA73446B-A422-4326-A348-B0DE7DD44A86}" presName="childText" presStyleLbl="bgAcc1" presStyleIdx="3" presStyleCnt="14">
         <dgm:presLayoutVars>
           <dgm:bulletEnabled val="1"/>
         </dgm:presLayoutVars>
@@ -1457,11 +1661,11 @@
       <dgm:spPr/>
     </dgm:pt>
     <dgm:pt modelId="{3811DC7C-2AAC-4B4F-A431-3554A31D52A6}" type="pres">
-      <dgm:prSet presAssocID="{E2EE1F9B-72E8-4DB3-BAFC-A45061F0178A}" presName="Name13" presStyleLbl="parChTrans1D2" presStyleIdx="4" presStyleCnt="11"/>
+      <dgm:prSet presAssocID="{E2EE1F9B-72E8-4DB3-BAFC-A45061F0178A}" presName="Name13" presStyleLbl="parChTrans1D2" presStyleIdx="4" presStyleCnt="14"/>
       <dgm:spPr/>
     </dgm:pt>
     <dgm:pt modelId="{B0C58C55-2F23-450B-9F61-EFDEF57B7CB0}" type="pres">
-      <dgm:prSet presAssocID="{032389D6-946B-4BB3-81F4-2A1644AD0B9A}" presName="childText" presStyleLbl="bgAcc1" presStyleIdx="4" presStyleCnt="11">
+      <dgm:prSet presAssocID="{032389D6-946B-4BB3-81F4-2A1644AD0B9A}" presName="childText" presStyleLbl="bgAcc1" presStyleIdx="4" presStyleCnt="14">
         <dgm:presLayoutVars>
           <dgm:bulletEnabled val="1"/>
         </dgm:presLayoutVars>
@@ -1469,11 +1673,11 @@
       <dgm:spPr/>
     </dgm:pt>
     <dgm:pt modelId="{228B03A3-2B3A-42B2-9343-105EAC161EF4}" type="pres">
-      <dgm:prSet presAssocID="{CFAFB6E5-0F76-4FC4-BA8A-E84684538208}" presName="Name13" presStyleLbl="parChTrans1D2" presStyleIdx="5" presStyleCnt="11"/>
+      <dgm:prSet presAssocID="{CFAFB6E5-0F76-4FC4-BA8A-E84684538208}" presName="Name13" presStyleLbl="parChTrans1D2" presStyleIdx="5" presStyleCnt="14"/>
       <dgm:spPr/>
     </dgm:pt>
     <dgm:pt modelId="{AE9B91B1-8DBD-49E8-BEA5-44131E256BFE}" type="pres">
-      <dgm:prSet presAssocID="{53B3501B-D7C1-4FA5-82A0-8B68726C2A70}" presName="childText" presStyleLbl="bgAcc1" presStyleIdx="5" presStyleCnt="11">
+      <dgm:prSet presAssocID="{53B3501B-D7C1-4FA5-82A0-8B68726C2A70}" presName="childText" presStyleLbl="bgAcc1" presStyleIdx="5" presStyleCnt="14">
         <dgm:presLayoutVars>
           <dgm:bulletEnabled val="1"/>
         </dgm:presLayoutVars>
@@ -1481,11 +1685,11 @@
       <dgm:spPr/>
     </dgm:pt>
     <dgm:pt modelId="{0334BB62-7C44-4B2C-97B0-C439A955419F}" type="pres">
-      <dgm:prSet presAssocID="{51BF98EF-3EB6-4FFC-891C-E56C8FF2AF17}" presName="Name13" presStyleLbl="parChTrans1D2" presStyleIdx="6" presStyleCnt="11"/>
+      <dgm:prSet presAssocID="{51BF98EF-3EB6-4FFC-891C-E56C8FF2AF17}" presName="Name13" presStyleLbl="parChTrans1D2" presStyleIdx="6" presStyleCnt="14"/>
       <dgm:spPr/>
     </dgm:pt>
     <dgm:pt modelId="{0635709C-4513-4C46-B527-E7B451CE1404}" type="pres">
-      <dgm:prSet presAssocID="{EBAD62C2-1A59-4220-BA35-7FDD8A722DF8}" presName="childText" presStyleLbl="bgAcc1" presStyleIdx="6" presStyleCnt="11">
+      <dgm:prSet presAssocID="{EBAD62C2-1A59-4220-BA35-7FDD8A722DF8}" presName="childText" presStyleLbl="bgAcc1" presStyleIdx="6" presStyleCnt="14">
         <dgm:presLayoutVars>
           <dgm:bulletEnabled val="1"/>
         </dgm:presLayoutVars>
@@ -1493,11 +1697,11 @@
       <dgm:spPr/>
     </dgm:pt>
     <dgm:pt modelId="{02E7D88D-A90D-4AC0-9B23-5B6D16EE3521}" type="pres">
-      <dgm:prSet presAssocID="{BD49D998-0A2D-4855-863D-7F7F819C480B}" presName="Name13" presStyleLbl="parChTrans1D2" presStyleIdx="7" presStyleCnt="11"/>
+      <dgm:prSet presAssocID="{BD49D998-0A2D-4855-863D-7F7F819C480B}" presName="Name13" presStyleLbl="parChTrans1D2" presStyleIdx="7" presStyleCnt="14"/>
       <dgm:spPr/>
     </dgm:pt>
     <dgm:pt modelId="{E9C8C426-8DF9-45C6-87E0-A3E7E04BE621}" type="pres">
-      <dgm:prSet presAssocID="{2A344502-64AF-4402-875A-4A0DC2775C80}" presName="childText" presStyleLbl="bgAcc1" presStyleIdx="7" presStyleCnt="11">
+      <dgm:prSet presAssocID="{2A344502-64AF-4402-875A-4A0DC2775C80}" presName="childText" presStyleLbl="bgAcc1" presStyleIdx="7" presStyleCnt="14">
         <dgm:presLayoutVars>
           <dgm:bulletEnabled val="1"/>
         </dgm:presLayoutVars>
@@ -1505,11 +1709,11 @@
       <dgm:spPr/>
     </dgm:pt>
     <dgm:pt modelId="{5F9CC2CC-D7A7-4216-96A9-2C5A0525D273}" type="pres">
-      <dgm:prSet presAssocID="{D85DF57F-C431-4266-93BA-2918140ADAED}" presName="Name13" presStyleLbl="parChTrans1D2" presStyleIdx="8" presStyleCnt="11"/>
+      <dgm:prSet presAssocID="{D85DF57F-C431-4266-93BA-2918140ADAED}" presName="Name13" presStyleLbl="parChTrans1D2" presStyleIdx="8" presStyleCnt="14"/>
       <dgm:spPr/>
     </dgm:pt>
     <dgm:pt modelId="{C06D055B-B263-4363-9A11-95D10D3B56C4}" type="pres">
-      <dgm:prSet presAssocID="{0DE6765B-2DB4-45A7-83E0-08B1E4602B57}" presName="childText" presStyleLbl="bgAcc1" presStyleIdx="8" presStyleCnt="11">
+      <dgm:prSet presAssocID="{0DE6765B-2DB4-45A7-83E0-08B1E4602B57}" presName="childText" presStyleLbl="bgAcc1" presStyleIdx="8" presStyleCnt="14">
         <dgm:presLayoutVars>
           <dgm:bulletEnabled val="1"/>
         </dgm:presLayoutVars>
@@ -1517,11 +1721,11 @@
       <dgm:spPr/>
     </dgm:pt>
     <dgm:pt modelId="{53F4F833-FF02-45F6-8C5E-CB9C03FE0D2E}" type="pres">
-      <dgm:prSet presAssocID="{25275D89-D994-43C3-8969-45719DF0AE1B}" presName="Name13" presStyleLbl="parChTrans1D2" presStyleIdx="9" presStyleCnt="11"/>
+      <dgm:prSet presAssocID="{25275D89-D994-43C3-8969-45719DF0AE1B}" presName="Name13" presStyleLbl="parChTrans1D2" presStyleIdx="9" presStyleCnt="14"/>
       <dgm:spPr/>
     </dgm:pt>
     <dgm:pt modelId="{960B81BF-FD31-4B50-BF35-FBC3AAC089E5}" type="pres">
-      <dgm:prSet presAssocID="{A231A93F-201C-4772-8931-7BFDBF09EDA5}" presName="childText" presStyleLbl="bgAcc1" presStyleIdx="9" presStyleCnt="11">
+      <dgm:prSet presAssocID="{A231A93F-201C-4772-8931-7BFDBF09EDA5}" presName="childText" presStyleLbl="bgAcc1" presStyleIdx="9" presStyleCnt="14">
         <dgm:presLayoutVars>
           <dgm:bulletEnabled val="1"/>
         </dgm:presLayoutVars>
@@ -1529,11 +1733,47 @@
       <dgm:spPr/>
     </dgm:pt>
     <dgm:pt modelId="{E37019A9-5E9A-4B27-94A8-96874D2EB6C3}" type="pres">
-      <dgm:prSet presAssocID="{848CAA27-57F9-49C5-8EA8-9ADEC1464C53}" presName="Name13" presStyleLbl="parChTrans1D2" presStyleIdx="10" presStyleCnt="11"/>
+      <dgm:prSet presAssocID="{848CAA27-57F9-49C5-8EA8-9ADEC1464C53}" presName="Name13" presStyleLbl="parChTrans1D2" presStyleIdx="10" presStyleCnt="14"/>
       <dgm:spPr/>
     </dgm:pt>
     <dgm:pt modelId="{A16CFCC3-3CB3-455C-A747-751DF5DC9BD6}" type="pres">
-      <dgm:prSet presAssocID="{3FDA13BB-5CEF-4BE9-9681-56895241E193}" presName="childText" presStyleLbl="bgAcc1" presStyleIdx="10" presStyleCnt="11">
+      <dgm:prSet presAssocID="{3FDA13BB-5CEF-4BE9-9681-56895241E193}" presName="childText" presStyleLbl="bgAcc1" presStyleIdx="10" presStyleCnt="14">
+        <dgm:presLayoutVars>
+          <dgm:bulletEnabled val="1"/>
+        </dgm:presLayoutVars>
+      </dgm:prSet>
+      <dgm:spPr/>
+    </dgm:pt>
+    <dgm:pt modelId="{A8DBAE78-4525-4333-8A2C-B5A6DDBCA772}" type="pres">
+      <dgm:prSet presAssocID="{A238B559-DCAD-41A0-A740-8F51CDDE6379}" presName="Name13" presStyleLbl="parChTrans1D2" presStyleIdx="11" presStyleCnt="14"/>
+      <dgm:spPr/>
+    </dgm:pt>
+    <dgm:pt modelId="{39B0D5E8-B8B4-469C-BFD6-9B81952BB16C}" type="pres">
+      <dgm:prSet presAssocID="{003EA300-936D-4F79-9145-DF4C96569D6A}" presName="childText" presStyleLbl="bgAcc1" presStyleIdx="11" presStyleCnt="14">
+        <dgm:presLayoutVars>
+          <dgm:bulletEnabled val="1"/>
+        </dgm:presLayoutVars>
+      </dgm:prSet>
+      <dgm:spPr/>
+    </dgm:pt>
+    <dgm:pt modelId="{BF462AD6-39FE-4B82-8810-F25CE7C5AB83}" type="pres">
+      <dgm:prSet presAssocID="{16E98EEA-00D7-4A33-96C8-08620AA9A2F4}" presName="Name13" presStyleLbl="parChTrans1D2" presStyleIdx="12" presStyleCnt="14"/>
+      <dgm:spPr/>
+    </dgm:pt>
+    <dgm:pt modelId="{EA9B2401-DD1C-466D-83A2-F583BEB1FE7E}" type="pres">
+      <dgm:prSet presAssocID="{5860AA6A-3923-4FF3-8650-F12DE7A16B33}" presName="childText" presStyleLbl="bgAcc1" presStyleIdx="12" presStyleCnt="14">
+        <dgm:presLayoutVars>
+          <dgm:bulletEnabled val="1"/>
+        </dgm:presLayoutVars>
+      </dgm:prSet>
+      <dgm:spPr/>
+    </dgm:pt>
+    <dgm:pt modelId="{22105E9C-12B7-4CC9-942C-F306A785776E}" type="pres">
+      <dgm:prSet presAssocID="{ABC52B77-F469-4A41-A71F-5ABAE99246CB}" presName="Name13" presStyleLbl="parChTrans1D2" presStyleIdx="13" presStyleCnt="14"/>
+      <dgm:spPr/>
+    </dgm:pt>
+    <dgm:pt modelId="{3934689C-FA06-428D-990A-1FC579FD5D73}" type="pres">
+      <dgm:prSet presAssocID="{50875F28-2D52-4C6F-8BF7-791007AC6A99}" presName="childText" presStyleLbl="bgAcc1" presStyleIdx="13" presStyleCnt="14">
         <dgm:presLayoutVars>
           <dgm:bulletEnabled val="1"/>
         </dgm:presLayoutVars>
@@ -1546,8 +1786,10 @@
     <dgm:cxn modelId="{D07DCC00-046C-4E45-9C35-2C58D149768C}" type="presOf" srcId="{630F68DB-25CE-4283-B054-FD78FAADF1FF}" destId="{A3390386-4FD8-4AFD-92F2-41DB4B93F24F}" srcOrd="0" destOrd="0" presId="urn:microsoft.com/office/officeart/2005/8/layout/hierarchy3"/>
     <dgm:cxn modelId="{76D2B70F-DC6E-4927-990F-71C4B2E56C6D}" type="presOf" srcId="{25275D89-D994-43C3-8969-45719DF0AE1B}" destId="{53F4F833-FF02-45F6-8C5E-CB9C03FE0D2E}" srcOrd="0" destOrd="0" presId="urn:microsoft.com/office/officeart/2005/8/layout/hierarchy3"/>
     <dgm:cxn modelId="{8180D813-BB41-4784-B9FD-FE398A345DC3}" type="presOf" srcId="{DBDC9F76-7F8A-4CD3-9622-4CBAB04BA7B7}" destId="{EA3CCBCB-72E5-4726-93F5-F4F1892B5CB6}" srcOrd="0" destOrd="0" presId="urn:microsoft.com/office/officeart/2005/8/layout/hierarchy3"/>
+    <dgm:cxn modelId="{28DED014-60D9-4F6C-9DA7-79F91B45B836}" type="presOf" srcId="{A238B559-DCAD-41A0-A740-8F51CDDE6379}" destId="{A8DBAE78-4525-4333-8A2C-B5A6DDBCA772}" srcOrd="0" destOrd="0" presId="urn:microsoft.com/office/officeart/2005/8/layout/hierarchy3"/>
     <dgm:cxn modelId="{9294951B-7B99-41D9-8AD3-1DFFDB923140}" type="presOf" srcId="{EF20AD18-7E88-4D56-876D-5C1D2A454F6D}" destId="{04CAEDEE-4506-4EA3-A5B9-F7FE18C94C0D}" srcOrd="0" destOrd="0" presId="urn:microsoft.com/office/officeart/2005/8/layout/hierarchy3"/>
     <dgm:cxn modelId="{33B60C25-3E02-45BC-80EF-3B60A0CB9855}" type="presOf" srcId="{D85DF57F-C431-4266-93BA-2918140ADAED}" destId="{5F9CC2CC-D7A7-4216-96A9-2C5A0525D273}" srcOrd="0" destOrd="0" presId="urn:microsoft.com/office/officeart/2005/8/layout/hierarchy3"/>
+    <dgm:cxn modelId="{0EFF502E-EF9F-4636-BCB2-311C2EFBA7DA}" srcId="{14FF1E15-4A33-41F5-BCC6-1B6CD204F7E5}" destId="{5860AA6A-3923-4FF3-8650-F12DE7A16B33}" srcOrd="10" destOrd="0" parTransId="{16E98EEA-00D7-4A33-96C8-08620AA9A2F4}" sibTransId="{C0F1F837-0E57-4295-B4A7-7FA538451E6E}"/>
     <dgm:cxn modelId="{78EF7733-2236-407B-8930-311649B38F64}" type="presOf" srcId="{14FF1E15-4A33-41F5-BCC6-1B6CD204F7E5}" destId="{DE5A7490-39B7-43AD-AA65-1BC0A6FE2215}" srcOrd="0" destOrd="0" presId="urn:microsoft.com/office/officeart/2005/8/layout/hierarchy3"/>
     <dgm:cxn modelId="{45254435-D86C-4F12-AB60-5E08F0DE0755}" srcId="{14FF1E15-4A33-41F5-BCC6-1B6CD204F7E5}" destId="{EF20AD18-7E88-4D56-876D-5C1D2A454F6D}" srcOrd="0" destOrd="0" parTransId="{0B1BAE2A-A7C4-44A4-AC22-D4399D75B273}" sibTransId="{DDE16A42-0AEE-4652-9726-3DFC5929B480}"/>
     <dgm:cxn modelId="{39D1933C-AC0D-4A19-8967-23D3273626B8}" srcId="{14FF1E15-4A33-41F5-BCC6-1B6CD204F7E5}" destId="{032389D6-946B-4BB3-81F4-2A1644AD0B9A}" srcOrd="2" destOrd="0" parTransId="{E2EE1F9B-72E8-4DB3-BAFC-A45061F0178A}" sibTransId="{443018FF-26AA-49F0-8355-EF19CDF386BA}"/>
@@ -1557,12 +1799,16 @@
     <dgm:cxn modelId="{A65C7047-8412-4FD3-9330-C7331DE0B993}" type="presOf" srcId="{39A951B0-4451-493F-A724-C4865820AF8E}" destId="{B14A8BBB-FE6E-4D8B-80B3-357B456E60DF}" srcOrd="0" destOrd="0" presId="urn:microsoft.com/office/officeart/2005/8/layout/hierarchy3"/>
     <dgm:cxn modelId="{E00E9B6C-4A39-4347-A824-A0F3BC52F18C}" type="presOf" srcId="{14FF1E15-4A33-41F5-BCC6-1B6CD204F7E5}" destId="{43AFD759-D77E-4E8E-991A-8C48EAE0769A}" srcOrd="1" destOrd="0" presId="urn:microsoft.com/office/officeart/2005/8/layout/hierarchy3"/>
     <dgm:cxn modelId="{475BB76E-453D-4312-9E11-A64F489284FD}" srcId="{14FF1E15-4A33-41F5-BCC6-1B6CD204F7E5}" destId="{3FDA13BB-5CEF-4BE9-9681-56895241E193}" srcOrd="8" destOrd="0" parTransId="{848CAA27-57F9-49C5-8EA8-9ADEC1464C53}" sibTransId="{9732F404-7F81-4A33-9C8C-023D2488D5FA}"/>
+    <dgm:cxn modelId="{CF09C651-8142-4378-B5C4-959EF46DBD91}" type="presOf" srcId="{003EA300-936D-4F79-9145-DF4C96569D6A}" destId="{39B0D5E8-B8B4-469C-BFD6-9B81952BB16C}" srcOrd="0" destOrd="0" presId="urn:microsoft.com/office/officeart/2005/8/layout/hierarchy3"/>
     <dgm:cxn modelId="{C04DB956-3B74-4A0A-B5B6-0217627F6143}" srcId="{14FF1E15-4A33-41F5-BCC6-1B6CD204F7E5}" destId="{A231A93F-201C-4772-8931-7BFDBF09EDA5}" srcOrd="7" destOrd="0" parTransId="{25275D89-D994-43C3-8969-45719DF0AE1B}" sibTransId="{7A063EE6-CACD-4B95-844B-008C220E5750}"/>
     <dgm:cxn modelId="{4290EB81-C5D6-4257-B441-05A5CC9152E3}" srcId="{14FF1E15-4A33-41F5-BCC6-1B6CD204F7E5}" destId="{2A344502-64AF-4402-875A-4A0DC2775C80}" srcOrd="5" destOrd="0" parTransId="{BD49D998-0A2D-4855-863D-7F7F819C480B}" sibTransId="{1C2BF478-2410-47F2-B60A-29C456D15825}"/>
     <dgm:cxn modelId="{245AF684-0789-4A93-AD95-0F28550DC846}" srcId="{14FF1E15-4A33-41F5-BCC6-1B6CD204F7E5}" destId="{53B3501B-D7C1-4FA5-82A0-8B68726C2A70}" srcOrd="3" destOrd="0" parTransId="{CFAFB6E5-0F76-4FC4-BA8A-E84684538208}" sibTransId="{F00BFC95-C6AA-4913-8740-DE8F3637DDBC}"/>
+    <dgm:cxn modelId="{AFE63A8B-806C-4E42-9C1F-C63F41879829}" type="presOf" srcId="{50875F28-2D52-4C6F-8BF7-791007AC6A99}" destId="{3934689C-FA06-428D-990A-1FC579FD5D73}" srcOrd="0" destOrd="0" presId="urn:microsoft.com/office/officeart/2005/8/layout/hierarchy3"/>
     <dgm:cxn modelId="{A4831F8C-5A47-477F-867D-C43A17F4DD5F}" srcId="{14FF1E15-4A33-41F5-BCC6-1B6CD204F7E5}" destId="{EBAD62C2-1A59-4220-BA35-7FDD8A722DF8}" srcOrd="4" destOrd="0" parTransId="{51BF98EF-3EB6-4FFC-891C-E56C8FF2AF17}" sibTransId="{D01F124E-784B-48F1-8D2D-44102E52B659}"/>
     <dgm:cxn modelId="{234B1B91-EDD1-4B8A-98D4-9A79FE01A957}" type="presOf" srcId="{53B3501B-D7C1-4FA5-82A0-8B68726C2A70}" destId="{AE9B91B1-8DBD-49E8-BEA5-44131E256BFE}" srcOrd="0" destOrd="0" presId="urn:microsoft.com/office/officeart/2005/8/layout/hierarchy3"/>
+    <dgm:cxn modelId="{41323393-BA93-473A-B582-21FB39D25E90}" type="presOf" srcId="{16E98EEA-00D7-4A33-96C8-08620AA9A2F4}" destId="{BF462AD6-39FE-4B82-8810-F25CE7C5AB83}" srcOrd="0" destOrd="0" presId="urn:microsoft.com/office/officeart/2005/8/layout/hierarchy3"/>
     <dgm:cxn modelId="{C578F897-BC53-4D31-B8F1-56F33064ECF8}" type="presOf" srcId="{DBDC9F76-7F8A-4CD3-9622-4CBAB04BA7B7}" destId="{69D9E8EA-BE0C-4A0F-8AEB-64A8B2CD804A}" srcOrd="1" destOrd="0" presId="urn:microsoft.com/office/officeart/2005/8/layout/hierarchy3"/>
+    <dgm:cxn modelId="{1D30069D-A637-4D89-A511-C3C6D9B4ED59}" type="presOf" srcId="{5860AA6A-3923-4FF3-8650-F12DE7A16B33}" destId="{EA9B2401-DD1C-466D-83A2-F583BEB1FE7E}" srcOrd="0" destOrd="0" presId="urn:microsoft.com/office/officeart/2005/8/layout/hierarchy3"/>
     <dgm:cxn modelId="{F8F6699D-6924-481F-B2D7-A318FA92EE7B}" type="presOf" srcId="{BD49D998-0A2D-4855-863D-7F7F819C480B}" destId="{02E7D88D-A90D-4AC0-9B23-5B6D16EE3521}" srcOrd="0" destOrd="0" presId="urn:microsoft.com/office/officeart/2005/8/layout/hierarchy3"/>
     <dgm:cxn modelId="{B7A8659E-2796-43BF-9110-310DD5A1D8A8}" srcId="{DBDC9F76-7F8A-4CD3-9622-4CBAB04BA7B7}" destId="{011E2DB7-EE10-49E0-AFA2-9CDC0813BA16}" srcOrd="0" destOrd="0" parTransId="{630F68DB-25CE-4283-B054-FD78FAADF1FF}" sibTransId="{6548585F-AF74-4B36-B927-55839627A1CB}"/>
     <dgm:cxn modelId="{6D705BA2-C07F-4A51-88D7-10A40992F71F}" srcId="{E2889C1D-D96E-4F74-AAA1-C39A76FF760E}" destId="{14FF1E15-4A33-41F5-BCC6-1B6CD204F7E5}" srcOrd="1" destOrd="0" parTransId="{EDBBEE89-CA30-46E7-BD05-4ADBF8B97D17}" sibTransId="{CCD34D68-31ED-4D72-BB17-C0AF74AA3725}"/>
@@ -1577,11 +1823,14 @@
     <dgm:cxn modelId="{476984CA-628D-40CB-84F8-A69C17FDCD82}" type="presOf" srcId="{E2889C1D-D96E-4F74-AAA1-C39A76FF760E}" destId="{D4A4ADBC-B040-4719-938C-99640A53EC84}" srcOrd="0" destOrd="0" presId="urn:microsoft.com/office/officeart/2005/8/layout/hierarchy3"/>
     <dgm:cxn modelId="{F93217CC-1CA6-4E31-9ADC-6D83C6BBC77B}" type="presOf" srcId="{2A344502-64AF-4402-875A-4A0DC2775C80}" destId="{E9C8C426-8DF9-45C6-87E0-A3E7E04BE621}" srcOrd="0" destOrd="0" presId="urn:microsoft.com/office/officeart/2005/8/layout/hierarchy3"/>
     <dgm:cxn modelId="{98CAC4D9-C116-4B98-9AE4-23B5EAE558D3}" type="presOf" srcId="{CFAFB6E5-0F76-4FC4-BA8A-E84684538208}" destId="{228B03A3-2B3A-42B2-9343-105EAC161EF4}" srcOrd="0" destOrd="0" presId="urn:microsoft.com/office/officeart/2005/8/layout/hierarchy3"/>
+    <dgm:cxn modelId="{109DE8E0-3BD8-4BA1-901D-B5E3B96D8BA1}" type="presOf" srcId="{ABC52B77-F469-4A41-A71F-5ABAE99246CB}" destId="{22105E9C-12B7-4CC9-942C-F306A785776E}" srcOrd="0" destOrd="0" presId="urn:microsoft.com/office/officeart/2005/8/layout/hierarchy3"/>
     <dgm:cxn modelId="{61CF13E3-311A-489B-8D77-33B276A1F488}" type="presOf" srcId="{916784B3-2EFD-4233-AB8A-50772124D55B}" destId="{3D429404-7F59-4FA7-9170-D8CD3E73363F}" srcOrd="0" destOrd="0" presId="urn:microsoft.com/office/officeart/2005/8/layout/hierarchy3"/>
     <dgm:cxn modelId="{D17985E4-F8C0-4B43-8977-E3D09AAA03D6}" type="presOf" srcId="{848CAA27-57F9-49C5-8EA8-9ADEC1464C53}" destId="{E37019A9-5E9A-4B27-94A8-96874D2EB6C3}" srcOrd="0" destOrd="0" presId="urn:microsoft.com/office/officeart/2005/8/layout/hierarchy3"/>
     <dgm:cxn modelId="{432AA4E4-8B61-4536-BEA2-1A653BCB279E}" type="presOf" srcId="{0B1BAE2A-A7C4-44A4-AC22-D4399D75B273}" destId="{8A6F4C9C-712D-48F9-82BE-2C20CCADC8F6}" srcOrd="0" destOrd="0" presId="urn:microsoft.com/office/officeart/2005/8/layout/hierarchy3"/>
     <dgm:cxn modelId="{AD9A40E6-66CC-4BA4-B09B-76FC5502CF6A}" type="presOf" srcId="{51BF98EF-3EB6-4FFC-891C-E56C8FF2AF17}" destId="{0334BB62-7C44-4B2C-97B0-C439A955419F}" srcOrd="0" destOrd="0" presId="urn:microsoft.com/office/officeart/2005/8/layout/hierarchy3"/>
+    <dgm:cxn modelId="{55B5BAE7-6F3A-469A-B448-649A9DED2A9D}" srcId="{14FF1E15-4A33-41F5-BCC6-1B6CD204F7E5}" destId="{50875F28-2D52-4C6F-8BF7-791007AC6A99}" srcOrd="11" destOrd="0" parTransId="{ABC52B77-F469-4A41-A71F-5ABAE99246CB}" sibTransId="{DE508627-5A6B-48F2-830B-EDFE9358B7EC}"/>
     <dgm:cxn modelId="{F983DBEE-4D4F-4D38-8539-BB914F31E0FF}" type="presOf" srcId="{EBAD62C2-1A59-4220-BA35-7FDD8A722DF8}" destId="{0635709C-4513-4C46-B527-E7B451CE1404}" srcOrd="0" destOrd="0" presId="urn:microsoft.com/office/officeart/2005/8/layout/hierarchy3"/>
+    <dgm:cxn modelId="{957B2AFD-ECDC-4F5F-9DD0-16B86D9D42EC}" srcId="{14FF1E15-4A33-41F5-BCC6-1B6CD204F7E5}" destId="{003EA300-936D-4F79-9145-DF4C96569D6A}" srcOrd="9" destOrd="0" parTransId="{A238B559-DCAD-41A0-A740-8F51CDDE6379}" sibTransId="{10936D95-45B3-4E18-A423-4B211891C7BF}"/>
     <dgm:cxn modelId="{9FD4F12C-AFF2-4B8C-B20C-053343786FAF}" type="presParOf" srcId="{D4A4ADBC-B040-4719-938C-99640A53EC84}" destId="{A636EA4C-D826-4679-9494-B0A413D60919}" srcOrd="0" destOrd="0" presId="urn:microsoft.com/office/officeart/2005/8/layout/hierarchy3"/>
     <dgm:cxn modelId="{2454FC23-870F-401A-8047-21EED102B129}" type="presParOf" srcId="{A636EA4C-D826-4679-9494-B0A413D60919}" destId="{F7D19DB4-A749-420F-A4A3-26F115042F07}" srcOrd="0" destOrd="0" presId="urn:microsoft.com/office/officeart/2005/8/layout/hierarchy3"/>
     <dgm:cxn modelId="{B3797023-E1C9-4EFD-8F5D-2385C8180D23}" type="presParOf" srcId="{F7D19DB4-A749-420F-A4A3-26F115042F07}" destId="{EA3CCBCB-72E5-4726-93F5-F4F1892B5CB6}" srcOrd="0" destOrd="0" presId="urn:microsoft.com/office/officeart/2005/8/layout/hierarchy3"/>
@@ -1614,6 +1863,12 @@
     <dgm:cxn modelId="{C4348BB1-C0F1-438F-A1DC-8F8547330B91}" type="presParOf" srcId="{D93A3C72-6E82-4949-B0C9-B8AE4AB6287C}" destId="{960B81BF-FD31-4B50-BF35-FBC3AAC089E5}" srcOrd="15" destOrd="0" presId="urn:microsoft.com/office/officeart/2005/8/layout/hierarchy3"/>
     <dgm:cxn modelId="{CD6EF342-C6C3-478F-A2E8-BBBC5807AD80}" type="presParOf" srcId="{D93A3C72-6E82-4949-B0C9-B8AE4AB6287C}" destId="{E37019A9-5E9A-4B27-94A8-96874D2EB6C3}" srcOrd="16" destOrd="0" presId="urn:microsoft.com/office/officeart/2005/8/layout/hierarchy3"/>
     <dgm:cxn modelId="{AFD1CEED-5322-49FF-A2CE-C8273354A3A9}" type="presParOf" srcId="{D93A3C72-6E82-4949-B0C9-B8AE4AB6287C}" destId="{A16CFCC3-3CB3-455C-A747-751DF5DC9BD6}" srcOrd="17" destOrd="0" presId="urn:microsoft.com/office/officeart/2005/8/layout/hierarchy3"/>
+    <dgm:cxn modelId="{9B99B81E-7580-4DB3-9939-E7639F94C3B8}" type="presParOf" srcId="{D93A3C72-6E82-4949-B0C9-B8AE4AB6287C}" destId="{A8DBAE78-4525-4333-8A2C-B5A6DDBCA772}" srcOrd="18" destOrd="0" presId="urn:microsoft.com/office/officeart/2005/8/layout/hierarchy3"/>
+    <dgm:cxn modelId="{96EE6EB9-4702-4D3A-9F5E-AD4315460F55}" type="presParOf" srcId="{D93A3C72-6E82-4949-B0C9-B8AE4AB6287C}" destId="{39B0D5E8-B8B4-469C-BFD6-9B81952BB16C}" srcOrd="19" destOrd="0" presId="urn:microsoft.com/office/officeart/2005/8/layout/hierarchy3"/>
+    <dgm:cxn modelId="{268AD274-BA63-4CEA-9F92-30CD0BD27CAC}" type="presParOf" srcId="{D93A3C72-6E82-4949-B0C9-B8AE4AB6287C}" destId="{BF462AD6-39FE-4B82-8810-F25CE7C5AB83}" srcOrd="20" destOrd="0" presId="urn:microsoft.com/office/officeart/2005/8/layout/hierarchy3"/>
+    <dgm:cxn modelId="{D84264DC-9CBD-452D-A142-374A63E35652}" type="presParOf" srcId="{D93A3C72-6E82-4949-B0C9-B8AE4AB6287C}" destId="{EA9B2401-DD1C-466D-83A2-F583BEB1FE7E}" srcOrd="21" destOrd="0" presId="urn:microsoft.com/office/officeart/2005/8/layout/hierarchy3"/>
+    <dgm:cxn modelId="{CAF8DF72-ABD2-4ED9-8ACA-0754638BE71F}" type="presParOf" srcId="{D93A3C72-6E82-4949-B0C9-B8AE4AB6287C}" destId="{22105E9C-12B7-4CC9-942C-F306A785776E}" srcOrd="22" destOrd="0" presId="urn:microsoft.com/office/officeart/2005/8/layout/hierarchy3"/>
+    <dgm:cxn modelId="{FE596A48-6819-4BD8-9DE9-F0FDB92D8013}" type="presParOf" srcId="{D93A3C72-6E82-4949-B0C9-B8AE4AB6287C}" destId="{3934689C-FA06-428D-990A-1FC579FD5D73}" srcOrd="23" destOrd="0" presId="urn:microsoft.com/office/officeart/2005/8/layout/hierarchy3"/>
   </dgm:cxnLst>
   <dgm:bg/>
   <dgm:whole/>
@@ -1640,8 +1895,8 @@
       </dsp:nvSpPr>
       <dsp:spPr>
         <a:xfrm>
-          <a:off x="2282972" y="357"/>
-          <a:ext cx="804907" cy="402453"/>
+          <a:off x="2495778" y="2400"/>
+          <a:ext cx="615746" cy="307873"/>
         </a:xfrm>
         <a:prstGeom prst="roundRect">
           <a:avLst>
@@ -1685,12 +1940,12 @@
         </a:fontRef>
       </dsp:style>
       <dsp:txBody>
-        <a:bodyPr spcFirstLastPara="0" vert="horz" wrap="square" lIns="22860" tIns="15240" rIns="22860" bIns="15240" numCol="1" spcCol="1270" anchor="ctr" anchorCtr="0">
+        <a:bodyPr spcFirstLastPara="0" vert="horz" wrap="square" lIns="17145" tIns="11430" rIns="17145" bIns="11430" numCol="1" spcCol="1270" anchor="ctr" anchorCtr="0">
           <a:noAutofit/>
         </a:bodyPr>
         <a:lstStyle/>
         <a:p>
-          <a:pPr marL="0" lvl="0" indent="0" algn="ctr" defTabSz="533400">
+          <a:pPr marL="0" lvl="0" indent="0" algn="ctr" defTabSz="400050">
             <a:lnSpc>
               <a:spcPct val="90000"/>
             </a:lnSpc>
@@ -1703,14 +1958,14 @@
             <a:buNone/>
           </a:pPr>
           <a:r>
-            <a:rPr lang="de-DE" sz="1200" kern="1200" dirty="0"/>
+            <a:rPr lang="de-DE" sz="900" kern="1200" dirty="0"/>
             <a:t>Identity</a:t>
           </a:r>
         </a:p>
       </dsp:txBody>
       <dsp:txXfrm>
-        <a:off x="2294759" y="12144"/>
-        <a:ext cx="781333" cy="378879"/>
+        <a:off x="2504795" y="11417"/>
+        <a:ext cx="597712" cy="289839"/>
       </dsp:txXfrm>
     </dsp:sp>
     <dsp:sp modelId="{A3390386-4FD8-4AFD-92F2-41DB4B93F24F}">
@@ -1720,8 +1975,8 @@
       </dsp:nvSpPr>
       <dsp:spPr>
         <a:xfrm>
-          <a:off x="2317743" y="402811"/>
-          <a:ext cx="91440" cy="301840"/>
+          <a:off x="2511633" y="310274"/>
+          <a:ext cx="91440" cy="230905"/>
         </a:xfrm>
         <a:custGeom>
           <a:avLst/>
@@ -1735,10 +1990,10 @@
                 <a:pt x="45720" y="0"/>
               </a:moveTo>
               <a:lnTo>
-                <a:pt x="45720" y="301840"/>
+                <a:pt x="45720" y="230905"/>
               </a:lnTo>
               <a:lnTo>
-                <a:pt x="126210" y="301840"/>
+                <a:pt x="107294" y="230905"/>
               </a:lnTo>
             </a:path>
           </a:pathLst>
@@ -1778,8 +2033,8 @@
       </dsp:nvSpPr>
       <dsp:spPr>
         <a:xfrm>
-          <a:off x="2443953" y="503424"/>
-          <a:ext cx="643926" cy="402453"/>
+          <a:off x="2618927" y="387242"/>
+          <a:ext cx="492597" cy="307873"/>
         </a:xfrm>
         <a:prstGeom prst="roundRect">
           <a:avLst>
@@ -1822,12 +2077,12 @@
         <a:fontRef idx="minor"/>
       </dsp:style>
       <dsp:txBody>
-        <a:bodyPr spcFirstLastPara="0" vert="horz" wrap="square" lIns="15240" tIns="10160" rIns="15240" bIns="10160" numCol="1" spcCol="1270" anchor="ctr" anchorCtr="0">
+        <a:bodyPr spcFirstLastPara="0" vert="horz" wrap="square" lIns="11430" tIns="7620" rIns="11430" bIns="7620" numCol="1" spcCol="1270" anchor="ctr" anchorCtr="0">
           <a:noAutofit/>
         </a:bodyPr>
         <a:lstStyle/>
         <a:p>
-          <a:pPr marL="0" lvl="0" indent="0" algn="ctr" defTabSz="355600">
+          <a:pPr marL="0" lvl="0" indent="0" algn="ctr" defTabSz="266700">
             <a:lnSpc>
               <a:spcPct val="90000"/>
             </a:lnSpc>
@@ -1840,23 +2095,23 @@
             <a:buNone/>
           </a:pPr>
           <a:r>
-            <a:rPr lang="de-DE" sz="800" kern="1200" dirty="0" err="1"/>
+            <a:rPr lang="de-DE" sz="600" kern="1200" dirty="0" err="1"/>
             <a:t>Get</a:t>
           </a:r>
           <a:r>
-            <a:rPr lang="de-DE" sz="800" kern="1200" dirty="0"/>
+            <a:rPr lang="de-DE" sz="600" kern="1200" dirty="0"/>
             <a:t> </a:t>
           </a:r>
           <a:r>
-            <a:rPr lang="de-DE" sz="800" kern="1200" dirty="0" err="1"/>
+            <a:rPr lang="de-DE" sz="600" kern="1200" dirty="0" err="1"/>
             <a:t>sub</a:t>
           </a:r>
-          <a:endParaRPr lang="de-DE" sz="800" kern="1200" dirty="0"/>
+          <a:endParaRPr lang="de-DE" sz="600" kern="1200" dirty="0"/>
         </a:p>
       </dsp:txBody>
       <dsp:txXfrm>
-        <a:off x="2455740" y="515211"/>
-        <a:ext cx="620352" cy="378879"/>
+        <a:off x="2627944" y="396259"/>
+        <a:ext cx="474563" cy="289839"/>
       </dsp:txXfrm>
     </dsp:sp>
     <dsp:sp modelId="{3D429404-7F59-4FA7-9170-D8CD3E73363F}">
@@ -1866,8 +2121,8 @@
       </dsp:nvSpPr>
       <dsp:spPr>
         <a:xfrm>
-          <a:off x="2317743" y="402811"/>
-          <a:ext cx="91440" cy="804907"/>
+          <a:off x="2511633" y="310274"/>
+          <a:ext cx="91440" cy="615746"/>
         </a:xfrm>
         <a:custGeom>
           <a:avLst/>
@@ -1881,10 +2136,10 @@
                 <a:pt x="45720" y="0"/>
               </a:moveTo>
               <a:lnTo>
-                <a:pt x="45720" y="804907"/>
+                <a:pt x="45720" y="615746"/>
               </a:lnTo>
               <a:lnTo>
-                <a:pt x="126210" y="804907"/>
+                <a:pt x="107294" y="615746"/>
               </a:lnTo>
             </a:path>
           </a:pathLst>
@@ -1924,8 +2179,8 @@
       </dsp:nvSpPr>
       <dsp:spPr>
         <a:xfrm>
-          <a:off x="2443953" y="1006492"/>
-          <a:ext cx="643926" cy="402453"/>
+          <a:off x="2618927" y="772084"/>
+          <a:ext cx="492597" cy="307873"/>
         </a:xfrm>
         <a:prstGeom prst="roundRect">
           <a:avLst>
@@ -1944,9 +2199,9 @@
         <a:ln w="12700" cap="flat" cmpd="sng" algn="ctr">
           <a:solidFill>
             <a:schemeClr val="accent4">
-              <a:hueOff val="980089"/>
-              <a:satOff val="-4078"/>
-              <a:lumOff val="961"/>
+              <a:hueOff val="753915"/>
+              <a:satOff val="-3137"/>
+              <a:lumOff val="739"/>
               <a:alphaOff val="0"/>
             </a:schemeClr>
           </a:solidFill>
@@ -1968,12 +2223,12 @@
         <a:fontRef idx="minor"/>
       </dsp:style>
       <dsp:txBody>
-        <a:bodyPr spcFirstLastPara="0" vert="horz" wrap="square" lIns="15240" tIns="10160" rIns="15240" bIns="10160" numCol="1" spcCol="1270" anchor="ctr" anchorCtr="0">
+        <a:bodyPr spcFirstLastPara="0" vert="horz" wrap="square" lIns="11430" tIns="7620" rIns="11430" bIns="7620" numCol="1" spcCol="1270" anchor="ctr" anchorCtr="0">
           <a:noAutofit/>
         </a:bodyPr>
         <a:lstStyle/>
         <a:p>
-          <a:pPr marL="0" lvl="0" indent="0" algn="ctr" defTabSz="355600">
+          <a:pPr marL="0" lvl="0" indent="0" algn="ctr" defTabSz="266700">
             <a:lnSpc>
               <a:spcPct val="90000"/>
             </a:lnSpc>
@@ -1985,12 +2240,12 @@
             </a:spcAft>
             <a:buNone/>
           </a:pPr>
-          <a:endParaRPr lang="de-DE" sz="800" kern="1200"/>
+          <a:endParaRPr lang="de-DE" sz="600" kern="1200"/>
         </a:p>
       </dsp:txBody>
       <dsp:txXfrm>
-        <a:off x="2455740" y="1018279"/>
-        <a:ext cx="620352" cy="378879"/>
+        <a:off x="2627944" y="781101"/>
+        <a:ext cx="474563" cy="289839"/>
       </dsp:txXfrm>
     </dsp:sp>
     <dsp:sp modelId="{DE5A7490-39B7-43AD-AA65-1BC0A6FE2215}">
@@ -2000,8 +2255,8 @@
       </dsp:nvSpPr>
       <dsp:spPr>
         <a:xfrm>
-          <a:off x="3289106" y="357"/>
-          <a:ext cx="804907" cy="402453"/>
+          <a:off x="3265461" y="2400"/>
+          <a:ext cx="615746" cy="307873"/>
         </a:xfrm>
         <a:prstGeom prst="roundRect">
           <a:avLst>
@@ -2045,12 +2300,12 @@
         </a:fontRef>
       </dsp:style>
       <dsp:txBody>
-        <a:bodyPr spcFirstLastPara="0" vert="horz" wrap="square" lIns="22860" tIns="15240" rIns="22860" bIns="15240" numCol="1" spcCol="1270" anchor="ctr" anchorCtr="0">
+        <a:bodyPr spcFirstLastPara="0" vert="horz" wrap="square" lIns="17145" tIns="11430" rIns="17145" bIns="11430" numCol="1" spcCol="1270" anchor="ctr" anchorCtr="0">
           <a:noAutofit/>
         </a:bodyPr>
         <a:lstStyle/>
         <a:p>
-          <a:pPr marL="0" lvl="0" indent="0" algn="ctr" defTabSz="533400">
+          <a:pPr marL="0" lvl="0" indent="0" algn="ctr" defTabSz="400050">
             <a:lnSpc>
               <a:spcPct val="90000"/>
             </a:lnSpc>
@@ -2063,14 +2318,14 @@
             <a:buNone/>
           </a:pPr>
           <a:r>
-            <a:rPr lang="de-DE" sz="1200" kern="1200" dirty="0"/>
+            <a:rPr lang="de-DE" sz="900" kern="1200" dirty="0"/>
             <a:t>Permission</a:t>
           </a:r>
         </a:p>
       </dsp:txBody>
       <dsp:txXfrm>
-        <a:off x="3300893" y="12144"/>
-        <a:ext cx="781333" cy="378879"/>
+        <a:off x="3274478" y="11417"/>
+        <a:ext cx="597712" cy="289839"/>
       </dsp:txXfrm>
     </dsp:sp>
     <dsp:sp modelId="{8A6F4C9C-712D-48F9-82BE-2C20CCADC8F6}">
@@ -2080,8 +2335,8 @@
       </dsp:nvSpPr>
       <dsp:spPr>
         <a:xfrm>
-          <a:off x="3323877" y="402811"/>
-          <a:ext cx="91440" cy="301840"/>
+          <a:off x="3281316" y="310274"/>
+          <a:ext cx="91440" cy="230905"/>
         </a:xfrm>
         <a:custGeom>
           <a:avLst/>
@@ -2095,10 +2350,10 @@
                 <a:pt x="45720" y="0"/>
               </a:moveTo>
               <a:lnTo>
-                <a:pt x="45720" y="301840"/>
+                <a:pt x="45720" y="230905"/>
               </a:lnTo>
               <a:lnTo>
-                <a:pt x="126210" y="301840"/>
+                <a:pt x="107294" y="230905"/>
               </a:lnTo>
             </a:path>
           </a:pathLst>
@@ -2138,8 +2393,8 @@
       </dsp:nvSpPr>
       <dsp:spPr>
         <a:xfrm>
-          <a:off x="3450088" y="503424"/>
-          <a:ext cx="643926" cy="402453"/>
+          <a:off x="3388611" y="387242"/>
+          <a:ext cx="492597" cy="307873"/>
         </a:xfrm>
         <a:prstGeom prst="roundRect">
           <a:avLst>
@@ -2158,9 +2413,9 @@
         <a:ln w="12700" cap="flat" cmpd="sng" algn="ctr">
           <a:solidFill>
             <a:schemeClr val="accent4">
-              <a:hueOff val="1960178"/>
-              <a:satOff val="-8155"/>
-              <a:lumOff val="1922"/>
+              <a:hueOff val="1507829"/>
+              <a:satOff val="-6273"/>
+              <a:lumOff val="1478"/>
               <a:alphaOff val="0"/>
             </a:schemeClr>
           </a:solidFill>
@@ -2182,12 +2437,12 @@
         <a:fontRef idx="minor"/>
       </dsp:style>
       <dsp:txBody>
-        <a:bodyPr spcFirstLastPara="0" vert="horz" wrap="square" lIns="15240" tIns="10160" rIns="15240" bIns="10160" numCol="1" spcCol="1270" anchor="ctr" anchorCtr="0">
+        <a:bodyPr spcFirstLastPara="0" vert="horz" wrap="square" lIns="11430" tIns="7620" rIns="11430" bIns="7620" numCol="1" spcCol="1270" anchor="ctr" anchorCtr="0">
           <a:noAutofit/>
         </a:bodyPr>
         <a:lstStyle/>
         <a:p>
-          <a:pPr marL="0" lvl="0" indent="0" algn="ctr" defTabSz="355600">
+          <a:pPr marL="0" lvl="0" indent="0" algn="ctr" defTabSz="266700">
             <a:lnSpc>
               <a:spcPct val="90000"/>
             </a:lnSpc>
@@ -2200,26 +2455,26 @@
             <a:buNone/>
           </a:pPr>
           <a:r>
-            <a:rPr lang="de-DE" sz="800" kern="1200" dirty="0" err="1"/>
+            <a:rPr lang="de-DE" sz="600" kern="1200" dirty="0" err="1"/>
             <a:t>Assign</a:t>
           </a:r>
           <a:r>
-            <a:rPr lang="de-DE" sz="800" kern="1200" dirty="0"/>
+            <a:rPr lang="de-DE" sz="600" kern="1200" dirty="0"/>
             <a:t> </a:t>
           </a:r>
           <a:r>
-            <a:rPr lang="de-DE" sz="800" kern="1200" dirty="0" err="1"/>
+            <a:rPr lang="de-DE" sz="600" kern="1200" dirty="0" err="1"/>
             <a:t>sub</a:t>
           </a:r>
           <a:r>
-            <a:rPr lang="de-DE" sz="800" kern="1200" dirty="0"/>
+            <a:rPr lang="de-DE" sz="600" kern="1200" dirty="0"/>
             <a:t> to User</a:t>
           </a:r>
         </a:p>
       </dsp:txBody>
       <dsp:txXfrm>
-        <a:off x="3461875" y="515211"/>
-        <a:ext cx="620352" cy="378879"/>
+        <a:off x="3397628" y="396259"/>
+        <a:ext cx="474563" cy="289839"/>
       </dsp:txXfrm>
     </dsp:sp>
     <dsp:sp modelId="{B14A8BBB-FE6E-4D8B-80B3-357B456E60DF}">
@@ -2229,8 +2484,8 @@
       </dsp:nvSpPr>
       <dsp:spPr>
         <a:xfrm>
-          <a:off x="3323877" y="402811"/>
-          <a:ext cx="91440" cy="804907"/>
+          <a:off x="3281316" y="310274"/>
+          <a:ext cx="91440" cy="615746"/>
         </a:xfrm>
         <a:custGeom>
           <a:avLst/>
@@ -2244,10 +2499,10 @@
                 <a:pt x="45720" y="0"/>
               </a:moveTo>
               <a:lnTo>
-                <a:pt x="45720" y="804907"/>
+                <a:pt x="45720" y="615746"/>
               </a:lnTo>
               <a:lnTo>
-                <a:pt x="126210" y="804907"/>
+                <a:pt x="107294" y="615746"/>
               </a:lnTo>
             </a:path>
           </a:pathLst>
@@ -2287,8 +2542,8 @@
       </dsp:nvSpPr>
       <dsp:spPr>
         <a:xfrm>
-          <a:off x="3450088" y="1006492"/>
-          <a:ext cx="643926" cy="402453"/>
+          <a:off x="3388611" y="772084"/>
+          <a:ext cx="492597" cy="307873"/>
         </a:xfrm>
         <a:prstGeom prst="roundRect">
           <a:avLst>
@@ -2307,9 +2562,9 @@
         <a:ln w="12700" cap="flat" cmpd="sng" algn="ctr">
           <a:solidFill>
             <a:schemeClr val="accent4">
-              <a:hueOff val="2940267"/>
-              <a:satOff val="-12233"/>
-              <a:lumOff val="2882"/>
+              <a:hueOff val="2261744"/>
+              <a:satOff val="-9410"/>
+              <a:lumOff val="2217"/>
               <a:alphaOff val="0"/>
             </a:schemeClr>
           </a:solidFill>
@@ -2331,12 +2586,12 @@
         <a:fontRef idx="minor"/>
       </dsp:style>
       <dsp:txBody>
-        <a:bodyPr spcFirstLastPara="0" vert="horz" wrap="square" lIns="15240" tIns="10160" rIns="15240" bIns="10160" numCol="1" spcCol="1270" anchor="ctr" anchorCtr="0">
+        <a:bodyPr spcFirstLastPara="0" vert="horz" wrap="square" lIns="11430" tIns="7620" rIns="11430" bIns="7620" numCol="1" spcCol="1270" anchor="ctr" anchorCtr="0">
           <a:noAutofit/>
         </a:bodyPr>
         <a:lstStyle/>
         <a:p>
-          <a:pPr marL="0" lvl="0" indent="0" algn="ctr" defTabSz="355600">
+          <a:pPr marL="0" lvl="0" indent="0" algn="ctr" defTabSz="266700">
             <a:lnSpc>
               <a:spcPct val="90000"/>
             </a:lnSpc>
@@ -2349,31 +2604,31 @@
             <a:buNone/>
           </a:pPr>
           <a:r>
-            <a:rPr lang="de-DE" sz="800" kern="1200" dirty="0" err="1"/>
+            <a:rPr lang="de-DE" sz="600" kern="1200" dirty="0" err="1"/>
             <a:t>Get</a:t>
           </a:r>
           <a:r>
-            <a:rPr lang="de-DE" sz="800" kern="1200" dirty="0"/>
+            <a:rPr lang="de-DE" sz="600" kern="1200" dirty="0"/>
             <a:t> </a:t>
           </a:r>
           <a:r>
-            <a:rPr lang="de-DE" sz="800" kern="1200" dirty="0" err="1"/>
+            <a:rPr lang="de-DE" sz="600" kern="1200" dirty="0" err="1"/>
             <a:t>unknown</a:t>
           </a:r>
           <a:r>
-            <a:rPr lang="de-DE" sz="800" kern="1200" dirty="0"/>
+            <a:rPr lang="de-DE" sz="600" kern="1200" dirty="0"/>
             <a:t> </a:t>
           </a:r>
           <a:r>
-            <a:rPr lang="de-DE" sz="800" kern="1200" dirty="0" err="1"/>
+            <a:rPr lang="de-DE" sz="600" kern="1200" dirty="0" err="1"/>
             <a:t>subs</a:t>
           </a:r>
-          <a:endParaRPr lang="de-DE" sz="800" kern="1200" dirty="0"/>
+          <a:endParaRPr lang="de-DE" sz="600" kern="1200" dirty="0"/>
         </a:p>
       </dsp:txBody>
       <dsp:txXfrm>
-        <a:off x="3461875" y="1018279"/>
-        <a:ext cx="620352" cy="378879"/>
+        <a:off x="3397628" y="781101"/>
+        <a:ext cx="474563" cy="289839"/>
       </dsp:txXfrm>
     </dsp:sp>
     <dsp:sp modelId="{3811DC7C-2AAC-4B4F-A431-3554A31D52A6}">
@@ -2383,8 +2638,8 @@
       </dsp:nvSpPr>
       <dsp:spPr>
         <a:xfrm>
-          <a:off x="3323877" y="402811"/>
-          <a:ext cx="91440" cy="1307975"/>
+          <a:off x="3281316" y="310274"/>
+          <a:ext cx="91440" cy="1000588"/>
         </a:xfrm>
         <a:custGeom>
           <a:avLst/>
@@ -2398,10 +2653,10 @@
                 <a:pt x="45720" y="0"/>
               </a:moveTo>
               <a:lnTo>
-                <a:pt x="45720" y="1307975"/>
+                <a:pt x="45720" y="1000588"/>
               </a:lnTo>
               <a:lnTo>
-                <a:pt x="126210" y="1307975"/>
+                <a:pt x="107294" y="1000588"/>
               </a:lnTo>
             </a:path>
           </a:pathLst>
@@ -2441,8 +2696,8 @@
       </dsp:nvSpPr>
       <dsp:spPr>
         <a:xfrm>
-          <a:off x="3450088" y="1509559"/>
-          <a:ext cx="643926" cy="402453"/>
+          <a:off x="3388611" y="1156925"/>
+          <a:ext cx="492597" cy="307873"/>
         </a:xfrm>
         <a:prstGeom prst="roundRect">
           <a:avLst>
@@ -2461,9 +2716,9 @@
         <a:ln w="12700" cap="flat" cmpd="sng" algn="ctr">
           <a:solidFill>
             <a:schemeClr val="accent4">
-              <a:hueOff val="3920356"/>
-              <a:satOff val="-16311"/>
-              <a:lumOff val="3843"/>
+              <a:hueOff val="3015659"/>
+              <a:satOff val="-12547"/>
+              <a:lumOff val="2956"/>
               <a:alphaOff val="0"/>
             </a:schemeClr>
           </a:solidFill>
@@ -2485,12 +2740,12 @@
         <a:fontRef idx="minor"/>
       </dsp:style>
       <dsp:txBody>
-        <a:bodyPr spcFirstLastPara="0" vert="horz" wrap="square" lIns="15240" tIns="10160" rIns="15240" bIns="10160" numCol="1" spcCol="1270" anchor="ctr" anchorCtr="0">
+        <a:bodyPr spcFirstLastPara="0" vert="horz" wrap="square" lIns="11430" tIns="7620" rIns="11430" bIns="7620" numCol="1" spcCol="1270" anchor="ctr" anchorCtr="0">
           <a:noAutofit/>
         </a:bodyPr>
         <a:lstStyle/>
         <a:p>
-          <a:pPr marL="0" lvl="0" indent="0" algn="ctr" defTabSz="355600">
+          <a:pPr marL="0" lvl="0" indent="0" algn="ctr" defTabSz="266700">
             <a:lnSpc>
               <a:spcPct val="90000"/>
             </a:lnSpc>
@@ -2503,22 +2758,22 @@
             <a:buNone/>
           </a:pPr>
           <a:r>
-            <a:rPr lang="de-DE" sz="800" kern="1200" dirty="0"/>
+            <a:rPr lang="de-DE" sz="600" kern="1200" dirty="0"/>
             <a:t>Link </a:t>
           </a:r>
           <a:r>
-            <a:rPr lang="de-DE" sz="800" kern="1200" dirty="0" err="1"/>
+            <a:rPr lang="de-DE" sz="600" kern="1200" dirty="0" err="1"/>
             <a:t>sub</a:t>
           </a:r>
           <a:r>
-            <a:rPr lang="de-DE" sz="800" kern="1200" dirty="0"/>
+            <a:rPr lang="de-DE" sz="600" kern="1200" dirty="0"/>
             <a:t> to User</a:t>
           </a:r>
         </a:p>
       </dsp:txBody>
       <dsp:txXfrm>
-        <a:off x="3461875" y="1521346"/>
-        <a:ext cx="620352" cy="378879"/>
+        <a:off x="3397628" y="1165942"/>
+        <a:ext cx="474563" cy="289839"/>
       </dsp:txXfrm>
     </dsp:sp>
     <dsp:sp modelId="{228B03A3-2B3A-42B2-9343-105EAC161EF4}">
@@ -2528,8 +2783,8 @@
       </dsp:nvSpPr>
       <dsp:spPr>
         <a:xfrm>
-          <a:off x="3323877" y="402811"/>
-          <a:ext cx="91440" cy="1811042"/>
+          <a:off x="3281316" y="310274"/>
+          <a:ext cx="91440" cy="1385430"/>
         </a:xfrm>
         <a:custGeom>
           <a:avLst/>
@@ -2543,10 +2798,10 @@
                 <a:pt x="45720" y="0"/>
               </a:moveTo>
               <a:lnTo>
-                <a:pt x="45720" y="1811042"/>
+                <a:pt x="45720" y="1385430"/>
               </a:lnTo>
               <a:lnTo>
-                <a:pt x="126210" y="1811042"/>
+                <a:pt x="107294" y="1385430"/>
               </a:lnTo>
             </a:path>
           </a:pathLst>
@@ -2586,8 +2841,8 @@
       </dsp:nvSpPr>
       <dsp:spPr>
         <a:xfrm>
-          <a:off x="3450088" y="2012626"/>
-          <a:ext cx="643926" cy="402453"/>
+          <a:off x="3388611" y="1541767"/>
+          <a:ext cx="492597" cy="307873"/>
         </a:xfrm>
         <a:prstGeom prst="roundRect">
           <a:avLst>
@@ -2606,9 +2861,9 @@
         <a:ln w="12700" cap="flat" cmpd="sng" algn="ctr">
           <a:solidFill>
             <a:schemeClr val="accent4">
-              <a:hueOff val="4900445"/>
-              <a:satOff val="-20388"/>
-              <a:lumOff val="4804"/>
+              <a:hueOff val="3769573"/>
+              <a:satOff val="-15683"/>
+              <a:lumOff val="3695"/>
               <a:alphaOff val="0"/>
             </a:schemeClr>
           </a:solidFill>
@@ -2630,12 +2885,12 @@
         <a:fontRef idx="minor"/>
       </dsp:style>
       <dsp:txBody>
-        <a:bodyPr spcFirstLastPara="0" vert="horz" wrap="square" lIns="15240" tIns="10160" rIns="15240" bIns="10160" numCol="1" spcCol="1270" anchor="ctr" anchorCtr="0">
+        <a:bodyPr spcFirstLastPara="0" vert="horz" wrap="square" lIns="11430" tIns="7620" rIns="11430" bIns="7620" numCol="1" spcCol="1270" anchor="ctr" anchorCtr="0">
           <a:noAutofit/>
         </a:bodyPr>
         <a:lstStyle/>
         <a:p>
-          <a:pPr marL="0" lvl="0" indent="0" algn="ctr" defTabSz="355600">
+          <a:pPr marL="0" lvl="0" indent="0" algn="ctr" defTabSz="266700">
             <a:lnSpc>
               <a:spcPct val="90000"/>
             </a:lnSpc>
@@ -2648,14 +2903,14 @@
             <a:buNone/>
           </a:pPr>
           <a:r>
-            <a:rPr lang="de-DE" sz="800" kern="1200" dirty="0"/>
+            <a:rPr lang="de-DE" sz="600" kern="1200" dirty="0"/>
             <a:t>Create User</a:t>
           </a:r>
         </a:p>
       </dsp:txBody>
       <dsp:txXfrm>
-        <a:off x="3461875" y="2024413"/>
-        <a:ext cx="620352" cy="378879"/>
+        <a:off x="3397628" y="1550784"/>
+        <a:ext cx="474563" cy="289839"/>
       </dsp:txXfrm>
     </dsp:sp>
     <dsp:sp modelId="{0334BB62-7C44-4B2C-97B0-C439A955419F}">
@@ -2665,8 +2920,8 @@
       </dsp:nvSpPr>
       <dsp:spPr>
         <a:xfrm>
-          <a:off x="3323877" y="402811"/>
-          <a:ext cx="91440" cy="2314109"/>
+          <a:off x="3281316" y="310274"/>
+          <a:ext cx="91440" cy="1770271"/>
         </a:xfrm>
         <a:custGeom>
           <a:avLst/>
@@ -2680,10 +2935,10 @@
                 <a:pt x="45720" y="0"/>
               </a:moveTo>
               <a:lnTo>
-                <a:pt x="45720" y="2314109"/>
+                <a:pt x="45720" y="1770271"/>
               </a:lnTo>
               <a:lnTo>
-                <a:pt x="126210" y="2314109"/>
+                <a:pt x="107294" y="1770271"/>
               </a:lnTo>
             </a:path>
           </a:pathLst>
@@ -2723,8 +2978,8 @@
       </dsp:nvSpPr>
       <dsp:spPr>
         <a:xfrm>
-          <a:off x="3450088" y="2515694"/>
-          <a:ext cx="643926" cy="402453"/>
+          <a:off x="3388611" y="1926609"/>
+          <a:ext cx="492597" cy="307873"/>
         </a:xfrm>
         <a:prstGeom prst="roundRect">
           <a:avLst>
@@ -2743,9 +2998,9 @@
         <a:ln w="12700" cap="flat" cmpd="sng" algn="ctr">
           <a:solidFill>
             <a:schemeClr val="accent4">
-              <a:hueOff val="5880535"/>
-              <a:satOff val="-24466"/>
-              <a:lumOff val="5765"/>
+              <a:hueOff val="4523488"/>
+              <a:satOff val="-18820"/>
+              <a:lumOff val="4434"/>
               <a:alphaOff val="0"/>
             </a:schemeClr>
           </a:solidFill>
@@ -2767,12 +3022,12 @@
         <a:fontRef idx="minor"/>
       </dsp:style>
       <dsp:txBody>
-        <a:bodyPr spcFirstLastPara="0" vert="horz" wrap="square" lIns="15240" tIns="10160" rIns="15240" bIns="10160" numCol="1" spcCol="1270" anchor="ctr" anchorCtr="0">
+        <a:bodyPr spcFirstLastPara="0" vert="horz" wrap="square" lIns="11430" tIns="7620" rIns="11430" bIns="7620" numCol="1" spcCol="1270" anchor="ctr" anchorCtr="0">
           <a:noAutofit/>
         </a:bodyPr>
         <a:lstStyle/>
         <a:p>
-          <a:pPr marL="0" lvl="0" indent="0" algn="ctr" defTabSz="355600">
+          <a:pPr marL="0" lvl="0" indent="0" algn="ctr" defTabSz="266700">
             <a:lnSpc>
               <a:spcPct val="90000"/>
             </a:lnSpc>
@@ -2785,19 +3040,19 @@
             <a:buNone/>
           </a:pPr>
           <a:r>
-            <a:rPr lang="de-DE" sz="800" kern="1200" dirty="0"/>
+            <a:rPr lang="de-DE" sz="600" kern="1200" dirty="0"/>
             <a:t>Create </a:t>
           </a:r>
           <a:r>
-            <a:rPr lang="de-DE" sz="800" kern="1200" dirty="0" err="1"/>
+            <a:rPr lang="de-DE" sz="600" kern="1200" dirty="0" err="1"/>
             <a:t>Role</a:t>
           </a:r>
-          <a:endParaRPr lang="de-DE" sz="800" kern="1200" dirty="0"/>
+          <a:endParaRPr lang="de-DE" sz="600" kern="1200" dirty="0"/>
         </a:p>
       </dsp:txBody>
       <dsp:txXfrm>
-        <a:off x="3461875" y="2527481"/>
-        <a:ext cx="620352" cy="378879"/>
+        <a:off x="3397628" y="1935626"/>
+        <a:ext cx="474563" cy="289839"/>
       </dsp:txXfrm>
     </dsp:sp>
     <dsp:sp modelId="{02E7D88D-A90D-4AC0-9B23-5B6D16EE3521}">
@@ -2807,8 +3062,8 @@
       </dsp:nvSpPr>
       <dsp:spPr>
         <a:xfrm>
-          <a:off x="3323877" y="402811"/>
-          <a:ext cx="91440" cy="2817177"/>
+          <a:off x="3281316" y="310274"/>
+          <a:ext cx="91440" cy="2155113"/>
         </a:xfrm>
         <a:custGeom>
           <a:avLst/>
@@ -2822,10 +3077,10 @@
                 <a:pt x="45720" y="0"/>
               </a:moveTo>
               <a:lnTo>
-                <a:pt x="45720" y="2817177"/>
+                <a:pt x="45720" y="2155113"/>
               </a:lnTo>
               <a:lnTo>
-                <a:pt x="126210" y="2817177"/>
+                <a:pt x="107294" y="2155113"/>
               </a:lnTo>
             </a:path>
           </a:pathLst>
@@ -2865,8 +3120,8 @@
       </dsp:nvSpPr>
       <dsp:spPr>
         <a:xfrm>
-          <a:off x="3450088" y="3018761"/>
-          <a:ext cx="643926" cy="402453"/>
+          <a:off x="3388611" y="2311450"/>
+          <a:ext cx="492597" cy="307873"/>
         </a:xfrm>
         <a:prstGeom prst="roundRect">
           <a:avLst>
@@ -2885,9 +3140,9 @@
         <a:ln w="12700" cap="flat" cmpd="sng" algn="ctr">
           <a:solidFill>
             <a:schemeClr val="accent4">
-              <a:hueOff val="6860623"/>
-              <a:satOff val="-28544"/>
-              <a:lumOff val="6726"/>
+              <a:hueOff val="5277403"/>
+              <a:satOff val="-21957"/>
+              <a:lumOff val="5174"/>
               <a:alphaOff val="0"/>
             </a:schemeClr>
           </a:solidFill>
@@ -2909,12 +3164,12 @@
         <a:fontRef idx="minor"/>
       </dsp:style>
       <dsp:txBody>
-        <a:bodyPr spcFirstLastPara="0" vert="horz" wrap="square" lIns="15240" tIns="10160" rIns="15240" bIns="10160" numCol="1" spcCol="1270" anchor="ctr" anchorCtr="0">
+        <a:bodyPr spcFirstLastPara="0" vert="horz" wrap="square" lIns="11430" tIns="7620" rIns="11430" bIns="7620" numCol="1" spcCol="1270" anchor="ctr" anchorCtr="0">
           <a:noAutofit/>
         </a:bodyPr>
         <a:lstStyle/>
         <a:p>
-          <a:pPr marL="0" lvl="0" indent="0" algn="ctr" defTabSz="355600">
+          <a:pPr marL="0" lvl="0" indent="0" algn="ctr" defTabSz="266700">
             <a:lnSpc>
               <a:spcPct val="90000"/>
             </a:lnSpc>
@@ -2927,14 +3182,14 @@
             <a:buNone/>
           </a:pPr>
           <a:r>
-            <a:rPr lang="de-DE" sz="800" kern="1200" dirty="0"/>
+            <a:rPr lang="de-DE" sz="600" kern="1200" dirty="0"/>
             <a:t>Create Permission</a:t>
           </a:r>
         </a:p>
       </dsp:txBody>
       <dsp:txXfrm>
-        <a:off x="3461875" y="3030548"/>
-        <a:ext cx="620352" cy="378879"/>
+        <a:off x="3397628" y="2320467"/>
+        <a:ext cx="474563" cy="289839"/>
       </dsp:txXfrm>
     </dsp:sp>
     <dsp:sp modelId="{5F9CC2CC-D7A7-4216-96A9-2C5A0525D273}">
@@ -2944,8 +3199,8 @@
       </dsp:nvSpPr>
       <dsp:spPr>
         <a:xfrm>
-          <a:off x="3323877" y="402811"/>
-          <a:ext cx="91440" cy="3320244"/>
+          <a:off x="3281316" y="310274"/>
+          <a:ext cx="91440" cy="2539955"/>
         </a:xfrm>
         <a:custGeom>
           <a:avLst/>
@@ -2959,10 +3214,10 @@
                 <a:pt x="45720" y="0"/>
               </a:moveTo>
               <a:lnTo>
-                <a:pt x="45720" y="3320244"/>
+                <a:pt x="45720" y="2539955"/>
               </a:lnTo>
               <a:lnTo>
-                <a:pt x="126210" y="3320244"/>
+                <a:pt x="107294" y="2539955"/>
               </a:lnTo>
             </a:path>
           </a:pathLst>
@@ -3002,8 +3257,8 @@
       </dsp:nvSpPr>
       <dsp:spPr>
         <a:xfrm>
-          <a:off x="3450088" y="3521828"/>
-          <a:ext cx="643926" cy="402453"/>
+          <a:off x="3388611" y="2696292"/>
+          <a:ext cx="492597" cy="307873"/>
         </a:xfrm>
         <a:prstGeom prst="roundRect">
           <a:avLst>
@@ -3022,9 +3277,9 @@
         <a:ln w="12700" cap="flat" cmpd="sng" algn="ctr">
           <a:solidFill>
             <a:schemeClr val="accent4">
-              <a:hueOff val="7840713"/>
-              <a:satOff val="-32622"/>
-              <a:lumOff val="7686"/>
+              <a:hueOff val="6031317"/>
+              <a:satOff val="-25094"/>
+              <a:lumOff val="5913"/>
               <a:alphaOff val="0"/>
             </a:schemeClr>
           </a:solidFill>
@@ -3046,12 +3301,12 @@
         <a:fontRef idx="minor"/>
       </dsp:style>
       <dsp:txBody>
-        <a:bodyPr spcFirstLastPara="0" vert="horz" wrap="square" lIns="15240" tIns="10160" rIns="15240" bIns="10160" numCol="1" spcCol="1270" anchor="ctr" anchorCtr="0">
+        <a:bodyPr spcFirstLastPara="0" vert="horz" wrap="square" lIns="11430" tIns="7620" rIns="11430" bIns="7620" numCol="1" spcCol="1270" anchor="ctr" anchorCtr="0">
           <a:noAutofit/>
         </a:bodyPr>
         <a:lstStyle/>
         <a:p>
-          <a:pPr marL="0" lvl="0" indent="0" algn="ctr" defTabSz="355600">
+          <a:pPr marL="0" lvl="0" indent="0" algn="ctr" defTabSz="266700">
             <a:lnSpc>
               <a:spcPct val="90000"/>
             </a:lnSpc>
@@ -3064,22 +3319,22 @@
             <a:buNone/>
           </a:pPr>
           <a:r>
-            <a:rPr lang="de-DE" sz="800" kern="1200" dirty="0"/>
+            <a:rPr lang="de-DE" sz="600" kern="1200" dirty="0"/>
             <a:t>Link </a:t>
           </a:r>
           <a:r>
-            <a:rPr lang="de-DE" sz="800" kern="1200" dirty="0" err="1"/>
+            <a:rPr lang="de-DE" sz="600" kern="1200" dirty="0" err="1"/>
             <a:t>Role</a:t>
           </a:r>
           <a:r>
-            <a:rPr lang="de-DE" sz="800" kern="1200" dirty="0"/>
+            <a:rPr lang="de-DE" sz="600" kern="1200" dirty="0"/>
             <a:t> to User</a:t>
           </a:r>
         </a:p>
       </dsp:txBody>
       <dsp:txXfrm>
-        <a:off x="3461875" y="3533615"/>
-        <a:ext cx="620352" cy="378879"/>
+        <a:off x="3397628" y="2705309"/>
+        <a:ext cx="474563" cy="289839"/>
       </dsp:txXfrm>
     </dsp:sp>
     <dsp:sp modelId="{53F4F833-FF02-45F6-8C5E-CB9C03FE0D2E}">
@@ -3089,8 +3344,8 @@
       </dsp:nvSpPr>
       <dsp:spPr>
         <a:xfrm>
-          <a:off x="3323877" y="402811"/>
-          <a:ext cx="91440" cy="3823311"/>
+          <a:off x="3281316" y="310274"/>
+          <a:ext cx="91440" cy="2924796"/>
         </a:xfrm>
         <a:custGeom>
           <a:avLst/>
@@ -3104,10 +3359,10 @@
                 <a:pt x="45720" y="0"/>
               </a:moveTo>
               <a:lnTo>
-                <a:pt x="45720" y="3823311"/>
+                <a:pt x="45720" y="2924796"/>
               </a:lnTo>
               <a:lnTo>
-                <a:pt x="126210" y="3823311"/>
+                <a:pt x="107294" y="2924796"/>
               </a:lnTo>
             </a:path>
           </a:pathLst>
@@ -3147,8 +3402,8 @@
       </dsp:nvSpPr>
       <dsp:spPr>
         <a:xfrm>
-          <a:off x="3450088" y="4024896"/>
-          <a:ext cx="643926" cy="402453"/>
+          <a:off x="3388611" y="3081134"/>
+          <a:ext cx="492597" cy="307873"/>
         </a:xfrm>
         <a:prstGeom prst="roundRect">
           <a:avLst>
@@ -3167,9 +3422,9 @@
         <a:ln w="12700" cap="flat" cmpd="sng" algn="ctr">
           <a:solidFill>
             <a:schemeClr val="accent4">
-              <a:hueOff val="8820801"/>
-              <a:satOff val="-36699"/>
-              <a:lumOff val="8647"/>
+              <a:hueOff val="6785232"/>
+              <a:satOff val="-28230"/>
+              <a:lumOff val="6652"/>
               <a:alphaOff val="0"/>
             </a:schemeClr>
           </a:solidFill>
@@ -3191,12 +3446,12 @@
         <a:fontRef idx="minor"/>
       </dsp:style>
       <dsp:txBody>
-        <a:bodyPr spcFirstLastPara="0" vert="horz" wrap="square" lIns="15240" tIns="10160" rIns="15240" bIns="10160" numCol="1" spcCol="1270" anchor="ctr" anchorCtr="0">
+        <a:bodyPr spcFirstLastPara="0" vert="horz" wrap="square" lIns="11430" tIns="7620" rIns="11430" bIns="7620" numCol="1" spcCol="1270" anchor="ctr" anchorCtr="0">
           <a:noAutofit/>
         </a:bodyPr>
         <a:lstStyle/>
         <a:p>
-          <a:pPr marL="0" lvl="0" indent="0" algn="ctr" defTabSz="355600">
+          <a:pPr marL="0" lvl="0" indent="0" algn="ctr" defTabSz="266700">
             <a:lnSpc>
               <a:spcPct val="90000"/>
             </a:lnSpc>
@@ -3209,19 +3464,19 @@
             <a:buNone/>
           </a:pPr>
           <a:r>
-            <a:rPr lang="de-DE" sz="800" kern="1200" dirty="0"/>
+            <a:rPr lang="de-DE" sz="600" kern="1200" dirty="0"/>
             <a:t>Link Permission to </a:t>
           </a:r>
           <a:r>
-            <a:rPr lang="de-DE" sz="800" kern="1200" dirty="0" err="1"/>
+            <a:rPr lang="de-DE" sz="600" kern="1200" dirty="0" err="1"/>
             <a:t>Role</a:t>
           </a:r>
-          <a:endParaRPr lang="de-DE" sz="800" kern="1200" dirty="0"/>
+          <a:endParaRPr lang="de-DE" sz="600" kern="1200" dirty="0"/>
         </a:p>
       </dsp:txBody>
       <dsp:txXfrm>
-        <a:off x="3461875" y="4036683"/>
-        <a:ext cx="620352" cy="378879"/>
+        <a:off x="3397628" y="3090151"/>
+        <a:ext cx="474563" cy="289839"/>
       </dsp:txXfrm>
     </dsp:sp>
     <dsp:sp modelId="{E37019A9-5E9A-4B27-94A8-96874D2EB6C3}">
@@ -3231,8 +3486,8 @@
       </dsp:nvSpPr>
       <dsp:spPr>
         <a:xfrm>
-          <a:off x="3323877" y="402811"/>
-          <a:ext cx="91440" cy="4326379"/>
+          <a:off x="3281316" y="310274"/>
+          <a:ext cx="91440" cy="3309638"/>
         </a:xfrm>
         <a:custGeom>
           <a:avLst/>
@@ -3246,10 +3501,10 @@
                 <a:pt x="45720" y="0"/>
               </a:moveTo>
               <a:lnTo>
-                <a:pt x="45720" y="4326379"/>
+                <a:pt x="45720" y="3309638"/>
               </a:lnTo>
               <a:lnTo>
-                <a:pt x="126210" y="4326379"/>
+                <a:pt x="107294" y="3309638"/>
               </a:lnTo>
             </a:path>
           </a:pathLst>
@@ -3289,8 +3544,433 @@
       </dsp:nvSpPr>
       <dsp:spPr>
         <a:xfrm>
-          <a:off x="3450088" y="4527963"/>
-          <a:ext cx="643926" cy="402453"/>
+          <a:off x="3388611" y="3465975"/>
+          <a:ext cx="492597" cy="307873"/>
+        </a:xfrm>
+        <a:prstGeom prst="roundRect">
+          <a:avLst>
+            <a:gd name="adj" fmla="val 10000"/>
+          </a:avLst>
+        </a:prstGeom>
+        <a:solidFill>
+          <a:schemeClr val="lt1">
+            <a:alpha val="90000"/>
+            <a:hueOff val="0"/>
+            <a:satOff val="0"/>
+            <a:lumOff val="0"/>
+            <a:alphaOff val="0"/>
+          </a:schemeClr>
+        </a:solidFill>
+        <a:ln w="12700" cap="flat" cmpd="sng" algn="ctr">
+          <a:solidFill>
+            <a:schemeClr val="accent4">
+              <a:hueOff val="7539147"/>
+              <a:satOff val="-31367"/>
+              <a:lumOff val="7391"/>
+              <a:alphaOff val="0"/>
+            </a:schemeClr>
+          </a:solidFill>
+          <a:prstDash val="solid"/>
+          <a:miter lim="800000"/>
+        </a:ln>
+        <a:effectLst/>
+      </dsp:spPr>
+      <dsp:style>
+        <a:lnRef idx="2">
+          <a:scrgbClr r="0" g="0" b="0"/>
+        </a:lnRef>
+        <a:fillRef idx="1">
+          <a:scrgbClr r="0" g="0" b="0"/>
+        </a:fillRef>
+        <a:effectRef idx="0">
+          <a:scrgbClr r="0" g="0" b="0"/>
+        </a:effectRef>
+        <a:fontRef idx="minor"/>
+      </dsp:style>
+      <dsp:txBody>
+        <a:bodyPr spcFirstLastPara="0" vert="horz" wrap="square" lIns="11430" tIns="7620" rIns="11430" bIns="7620" numCol="1" spcCol="1270" anchor="ctr" anchorCtr="0">
+          <a:noAutofit/>
+        </a:bodyPr>
+        <a:lstStyle/>
+        <a:p>
+          <a:pPr marL="0" lvl="0" indent="0" algn="ctr" defTabSz="266700">
+            <a:lnSpc>
+              <a:spcPct val="90000"/>
+            </a:lnSpc>
+            <a:spcBef>
+              <a:spcPct val="0"/>
+            </a:spcBef>
+            <a:spcAft>
+              <a:spcPct val="35000"/>
+            </a:spcAft>
+            <a:buNone/>
+          </a:pPr>
+          <a:r>
+            <a:rPr lang="de-DE" sz="600" kern="1200" dirty="0" err="1"/>
+            <a:t>Verify</a:t>
+          </a:r>
+          <a:r>
+            <a:rPr lang="de-DE" sz="600" kern="1200" dirty="0"/>
+            <a:t> </a:t>
+          </a:r>
+          <a:r>
+            <a:rPr lang="de-DE" sz="600" kern="1200" dirty="0" err="1"/>
+            <a:t>sub</a:t>
+          </a:r>
+          <a:r>
+            <a:rPr lang="de-DE" sz="600" kern="1200" dirty="0"/>
+            <a:t> vs. Permission</a:t>
+          </a:r>
+        </a:p>
+      </dsp:txBody>
+      <dsp:txXfrm>
+        <a:off x="3397628" y="3474992"/>
+        <a:ext cx="474563" cy="289839"/>
+      </dsp:txXfrm>
+    </dsp:sp>
+    <dsp:sp modelId="{A8DBAE78-4525-4333-8A2C-B5A6DDBCA772}">
+      <dsp:nvSpPr>
+        <dsp:cNvPr id="0" name=""/>
+        <dsp:cNvSpPr/>
+      </dsp:nvSpPr>
+      <dsp:spPr>
+        <a:xfrm>
+          <a:off x="3281316" y="310274"/>
+          <a:ext cx="91440" cy="3694480"/>
+        </a:xfrm>
+        <a:custGeom>
+          <a:avLst/>
+          <a:gdLst/>
+          <a:ahLst/>
+          <a:cxnLst/>
+          <a:rect l="0" t="0" r="0" b="0"/>
+          <a:pathLst>
+            <a:path>
+              <a:moveTo>
+                <a:pt x="45720" y="0"/>
+              </a:moveTo>
+              <a:lnTo>
+                <a:pt x="45720" y="3694480"/>
+              </a:lnTo>
+              <a:lnTo>
+                <a:pt x="107294" y="3694480"/>
+              </a:lnTo>
+            </a:path>
+          </a:pathLst>
+        </a:custGeom>
+        <a:noFill/>
+        <a:ln w="12700" cap="flat" cmpd="sng" algn="ctr">
+          <a:solidFill>
+            <a:schemeClr val="accent5">
+              <a:hueOff val="0"/>
+              <a:satOff val="0"/>
+              <a:lumOff val="0"/>
+              <a:alphaOff val="0"/>
+            </a:schemeClr>
+          </a:solidFill>
+          <a:prstDash val="solid"/>
+          <a:miter lim="800000"/>
+        </a:ln>
+        <a:effectLst/>
+      </dsp:spPr>
+      <dsp:style>
+        <a:lnRef idx="2">
+          <a:scrgbClr r="0" g="0" b="0"/>
+        </a:lnRef>
+        <a:fillRef idx="0">
+          <a:scrgbClr r="0" g="0" b="0"/>
+        </a:fillRef>
+        <a:effectRef idx="0">
+          <a:scrgbClr r="0" g="0" b="0"/>
+        </a:effectRef>
+        <a:fontRef idx="minor"/>
+      </dsp:style>
+    </dsp:sp>
+    <dsp:sp modelId="{39B0D5E8-B8B4-469C-BFD6-9B81952BB16C}">
+      <dsp:nvSpPr>
+        <dsp:cNvPr id="0" name=""/>
+        <dsp:cNvSpPr/>
+      </dsp:nvSpPr>
+      <dsp:spPr>
+        <a:xfrm>
+          <a:off x="3388611" y="3850817"/>
+          <a:ext cx="492597" cy="307873"/>
+        </a:xfrm>
+        <a:prstGeom prst="roundRect">
+          <a:avLst>
+            <a:gd name="adj" fmla="val 10000"/>
+          </a:avLst>
+        </a:prstGeom>
+        <a:solidFill>
+          <a:schemeClr val="lt1">
+            <a:alpha val="90000"/>
+            <a:hueOff val="0"/>
+            <a:satOff val="0"/>
+            <a:lumOff val="0"/>
+            <a:alphaOff val="0"/>
+          </a:schemeClr>
+        </a:solidFill>
+        <a:ln w="12700" cap="flat" cmpd="sng" algn="ctr">
+          <a:solidFill>
+            <a:schemeClr val="accent4">
+              <a:hueOff val="8293061"/>
+              <a:satOff val="-34504"/>
+              <a:lumOff val="8130"/>
+              <a:alphaOff val="0"/>
+            </a:schemeClr>
+          </a:solidFill>
+          <a:prstDash val="solid"/>
+          <a:miter lim="800000"/>
+        </a:ln>
+        <a:effectLst/>
+      </dsp:spPr>
+      <dsp:style>
+        <a:lnRef idx="2">
+          <a:scrgbClr r="0" g="0" b="0"/>
+        </a:lnRef>
+        <a:fillRef idx="1">
+          <a:scrgbClr r="0" g="0" b="0"/>
+        </a:fillRef>
+        <a:effectRef idx="0">
+          <a:scrgbClr r="0" g="0" b="0"/>
+        </a:effectRef>
+        <a:fontRef idx="minor"/>
+      </dsp:style>
+      <dsp:txBody>
+        <a:bodyPr spcFirstLastPara="0" vert="horz" wrap="square" lIns="11430" tIns="7620" rIns="11430" bIns="7620" numCol="1" spcCol="1270" anchor="ctr" anchorCtr="0">
+          <a:noAutofit/>
+        </a:bodyPr>
+        <a:lstStyle/>
+        <a:p>
+          <a:pPr marL="0" lvl="0" indent="0" algn="ctr" defTabSz="266700">
+            <a:lnSpc>
+              <a:spcPct val="90000"/>
+            </a:lnSpc>
+            <a:spcBef>
+              <a:spcPct val="0"/>
+            </a:spcBef>
+            <a:spcAft>
+              <a:spcPct val="35000"/>
+            </a:spcAft>
+            <a:buNone/>
+          </a:pPr>
+          <a:r>
+            <a:rPr lang="de-DE" sz="600" kern="1200"/>
+            <a:t>Get Users</a:t>
+          </a:r>
+          <a:endParaRPr lang="de-DE" sz="600" kern="1200" dirty="0"/>
+        </a:p>
+      </dsp:txBody>
+      <dsp:txXfrm>
+        <a:off x="3397628" y="3859834"/>
+        <a:ext cx="474563" cy="289839"/>
+      </dsp:txXfrm>
+    </dsp:sp>
+    <dsp:sp modelId="{BF462AD6-39FE-4B82-8810-F25CE7C5AB83}">
+      <dsp:nvSpPr>
+        <dsp:cNvPr id="0" name=""/>
+        <dsp:cNvSpPr/>
+      </dsp:nvSpPr>
+      <dsp:spPr>
+        <a:xfrm>
+          <a:off x="3281316" y="310274"/>
+          <a:ext cx="91440" cy="4079321"/>
+        </a:xfrm>
+        <a:custGeom>
+          <a:avLst/>
+          <a:gdLst/>
+          <a:ahLst/>
+          <a:cxnLst/>
+          <a:rect l="0" t="0" r="0" b="0"/>
+          <a:pathLst>
+            <a:path>
+              <a:moveTo>
+                <a:pt x="45720" y="0"/>
+              </a:moveTo>
+              <a:lnTo>
+                <a:pt x="45720" y="4079321"/>
+              </a:lnTo>
+              <a:lnTo>
+                <a:pt x="107294" y="4079321"/>
+              </a:lnTo>
+            </a:path>
+          </a:pathLst>
+        </a:custGeom>
+        <a:noFill/>
+        <a:ln w="12700" cap="flat" cmpd="sng" algn="ctr">
+          <a:solidFill>
+            <a:schemeClr val="accent5">
+              <a:hueOff val="0"/>
+              <a:satOff val="0"/>
+              <a:lumOff val="0"/>
+              <a:alphaOff val="0"/>
+            </a:schemeClr>
+          </a:solidFill>
+          <a:prstDash val="solid"/>
+          <a:miter lim="800000"/>
+        </a:ln>
+        <a:effectLst/>
+      </dsp:spPr>
+      <dsp:style>
+        <a:lnRef idx="2">
+          <a:scrgbClr r="0" g="0" b="0"/>
+        </a:lnRef>
+        <a:fillRef idx="0">
+          <a:scrgbClr r="0" g="0" b="0"/>
+        </a:fillRef>
+        <a:effectRef idx="0">
+          <a:scrgbClr r="0" g="0" b="0"/>
+        </a:effectRef>
+        <a:fontRef idx="minor"/>
+      </dsp:style>
+    </dsp:sp>
+    <dsp:sp modelId="{EA9B2401-DD1C-466D-83A2-F583BEB1FE7E}">
+      <dsp:nvSpPr>
+        <dsp:cNvPr id="0" name=""/>
+        <dsp:cNvSpPr/>
+      </dsp:nvSpPr>
+      <dsp:spPr>
+        <a:xfrm>
+          <a:off x="3388611" y="4235659"/>
+          <a:ext cx="492597" cy="307873"/>
+        </a:xfrm>
+        <a:prstGeom prst="roundRect">
+          <a:avLst>
+            <a:gd name="adj" fmla="val 10000"/>
+          </a:avLst>
+        </a:prstGeom>
+        <a:solidFill>
+          <a:schemeClr val="lt1">
+            <a:alpha val="90000"/>
+            <a:hueOff val="0"/>
+            <a:satOff val="0"/>
+            <a:lumOff val="0"/>
+            <a:alphaOff val="0"/>
+          </a:schemeClr>
+        </a:solidFill>
+        <a:ln w="12700" cap="flat" cmpd="sng" algn="ctr">
+          <a:solidFill>
+            <a:schemeClr val="accent4">
+              <a:hueOff val="9046976"/>
+              <a:satOff val="-37640"/>
+              <a:lumOff val="8869"/>
+              <a:alphaOff val="0"/>
+            </a:schemeClr>
+          </a:solidFill>
+          <a:prstDash val="solid"/>
+          <a:miter lim="800000"/>
+        </a:ln>
+        <a:effectLst/>
+      </dsp:spPr>
+      <dsp:style>
+        <a:lnRef idx="2">
+          <a:scrgbClr r="0" g="0" b="0"/>
+        </a:lnRef>
+        <a:fillRef idx="1">
+          <a:scrgbClr r="0" g="0" b="0"/>
+        </a:fillRef>
+        <a:effectRef idx="0">
+          <a:scrgbClr r="0" g="0" b="0"/>
+        </a:effectRef>
+        <a:fontRef idx="minor"/>
+      </dsp:style>
+      <dsp:txBody>
+        <a:bodyPr spcFirstLastPara="0" vert="horz" wrap="square" lIns="11430" tIns="7620" rIns="11430" bIns="7620" numCol="1" spcCol="1270" anchor="ctr" anchorCtr="0">
+          <a:noAutofit/>
+        </a:bodyPr>
+        <a:lstStyle/>
+        <a:p>
+          <a:pPr marL="0" lvl="0" indent="0" algn="ctr" defTabSz="266700">
+            <a:lnSpc>
+              <a:spcPct val="90000"/>
+            </a:lnSpc>
+            <a:spcBef>
+              <a:spcPct val="0"/>
+            </a:spcBef>
+            <a:spcAft>
+              <a:spcPct val="35000"/>
+            </a:spcAft>
+            <a:buNone/>
+          </a:pPr>
+          <a:r>
+            <a:rPr lang="de-DE" sz="600" kern="1200"/>
+            <a:t>Get Roles</a:t>
+          </a:r>
+          <a:endParaRPr lang="de-DE" sz="600" kern="1200" dirty="0"/>
+        </a:p>
+      </dsp:txBody>
+      <dsp:txXfrm>
+        <a:off x="3397628" y="4244676"/>
+        <a:ext cx="474563" cy="289839"/>
+      </dsp:txXfrm>
+    </dsp:sp>
+    <dsp:sp modelId="{22105E9C-12B7-4CC9-942C-F306A785776E}">
+      <dsp:nvSpPr>
+        <dsp:cNvPr id="0" name=""/>
+        <dsp:cNvSpPr/>
+      </dsp:nvSpPr>
+      <dsp:spPr>
+        <a:xfrm>
+          <a:off x="3281316" y="310274"/>
+          <a:ext cx="91440" cy="4464163"/>
+        </a:xfrm>
+        <a:custGeom>
+          <a:avLst/>
+          <a:gdLst/>
+          <a:ahLst/>
+          <a:cxnLst/>
+          <a:rect l="0" t="0" r="0" b="0"/>
+          <a:pathLst>
+            <a:path>
+              <a:moveTo>
+                <a:pt x="45720" y="0"/>
+              </a:moveTo>
+              <a:lnTo>
+                <a:pt x="45720" y="4464163"/>
+              </a:lnTo>
+              <a:lnTo>
+                <a:pt x="107294" y="4464163"/>
+              </a:lnTo>
+            </a:path>
+          </a:pathLst>
+        </a:custGeom>
+        <a:noFill/>
+        <a:ln w="12700" cap="flat" cmpd="sng" algn="ctr">
+          <a:solidFill>
+            <a:schemeClr val="accent5">
+              <a:hueOff val="0"/>
+              <a:satOff val="0"/>
+              <a:lumOff val="0"/>
+              <a:alphaOff val="0"/>
+            </a:schemeClr>
+          </a:solidFill>
+          <a:prstDash val="solid"/>
+          <a:miter lim="800000"/>
+        </a:ln>
+        <a:effectLst/>
+      </dsp:spPr>
+      <dsp:style>
+        <a:lnRef idx="2">
+          <a:scrgbClr r="0" g="0" b="0"/>
+        </a:lnRef>
+        <a:fillRef idx="0">
+          <a:scrgbClr r="0" g="0" b="0"/>
+        </a:fillRef>
+        <a:effectRef idx="0">
+          <a:scrgbClr r="0" g="0" b="0"/>
+        </a:effectRef>
+        <a:fontRef idx="minor"/>
+      </dsp:style>
+    </dsp:sp>
+    <dsp:sp modelId="{3934689C-FA06-428D-990A-1FC579FD5D73}">
+      <dsp:nvSpPr>
+        <dsp:cNvPr id="0" name=""/>
+        <dsp:cNvSpPr/>
+      </dsp:nvSpPr>
+      <dsp:spPr>
+        <a:xfrm>
+          <a:off x="3388611" y="4620500"/>
+          <a:ext cx="492597" cy="307873"/>
         </a:xfrm>
         <a:prstGeom prst="roundRect">
           <a:avLst>
@@ -3333,12 +4013,12 @@
         <a:fontRef idx="minor"/>
       </dsp:style>
       <dsp:txBody>
-        <a:bodyPr spcFirstLastPara="0" vert="horz" wrap="square" lIns="15240" tIns="10160" rIns="15240" bIns="10160" numCol="1" spcCol="1270" anchor="ctr" anchorCtr="0">
+        <a:bodyPr spcFirstLastPara="0" vert="horz" wrap="square" lIns="11430" tIns="7620" rIns="11430" bIns="7620" numCol="1" spcCol="1270" anchor="ctr" anchorCtr="0">
           <a:noAutofit/>
         </a:bodyPr>
         <a:lstStyle/>
         <a:p>
-          <a:pPr marL="0" lvl="0" indent="0" algn="ctr" defTabSz="355600">
+          <a:pPr marL="0" lvl="0" indent="0" algn="ctr" defTabSz="266700">
             <a:lnSpc>
               <a:spcPct val="90000"/>
             </a:lnSpc>
@@ -3351,31 +4031,15 @@
             <a:buNone/>
           </a:pPr>
           <a:r>
-            <a:rPr lang="de-DE" sz="800" kern="1200" dirty="0" err="1"/>
-            <a:t>Verify</a:t>
+            <a:rPr lang="de-DE" sz="600" kern="1200"/>
+            <a:t>Get Permissions</a:t>
           </a:r>
-          <a:r>
-            <a:rPr lang="de-DE" sz="800" kern="1200" dirty="0"/>
-            <a:t> </a:t>
-          </a:r>
-          <a:r>
-            <a:rPr lang="de-DE" sz="800" kern="1200" dirty="0" err="1"/>
-            <a:t>sub</a:t>
-          </a:r>
-          <a:r>
-            <a:rPr lang="de-DE" sz="800" kern="1200" dirty="0"/>
-            <a:t> vs. </a:t>
-          </a:r>
-          <a:r>
-            <a:rPr lang="de-DE" sz="800" kern="1200" dirty="0" err="1"/>
-            <a:t>permission</a:t>
-          </a:r>
-          <a:endParaRPr lang="de-DE" sz="800" kern="1200" dirty="0"/>
+          <a:endParaRPr lang="de-DE" sz="600" kern="1200" dirty="0"/>
         </a:p>
       </dsp:txBody>
       <dsp:txXfrm>
-        <a:off x="3461875" y="4539750"/>
-        <a:ext cx="620352" cy="378879"/>
+        <a:off x="3397628" y="4629517"/>
+        <a:ext cx="474563" cy="289839"/>
       </dsp:txXfrm>
     </dsp:sp>
   </dsp:spTree>
@@ -4855,7 +5519,7 @@
           <a:p>
             <a:fld id="{4E30C070-2E34-4C3A-B755-DD753BECDD85}" type="datetimeFigureOut">
               <a:rPr lang="de-DE" smtClean="0"/>
-              <a:t>04.05.2019</a:t>
+              <a:t>05.05.2019</a:t>
             </a:fld>
             <a:endParaRPr lang="de-DE"/>
           </a:p>
@@ -5053,7 +5717,7 @@
           <a:p>
             <a:fld id="{4E30C070-2E34-4C3A-B755-DD753BECDD85}" type="datetimeFigureOut">
               <a:rPr lang="de-DE" smtClean="0"/>
-              <a:t>04.05.2019</a:t>
+              <a:t>05.05.2019</a:t>
             </a:fld>
             <a:endParaRPr lang="de-DE"/>
           </a:p>
@@ -5261,7 +5925,7 @@
           <a:p>
             <a:fld id="{4E30C070-2E34-4C3A-B755-DD753BECDD85}" type="datetimeFigureOut">
               <a:rPr lang="de-DE" smtClean="0"/>
-              <a:t>04.05.2019</a:t>
+              <a:t>05.05.2019</a:t>
             </a:fld>
             <a:endParaRPr lang="de-DE"/>
           </a:p>
@@ -5459,7 +6123,7 @@
           <a:p>
             <a:fld id="{4E30C070-2E34-4C3A-B755-DD753BECDD85}" type="datetimeFigureOut">
               <a:rPr lang="de-DE" smtClean="0"/>
-              <a:t>04.05.2019</a:t>
+              <a:t>05.05.2019</a:t>
             </a:fld>
             <a:endParaRPr lang="de-DE"/>
           </a:p>
@@ -5734,7 +6398,7 @@
           <a:p>
             <a:fld id="{4E30C070-2E34-4C3A-B755-DD753BECDD85}" type="datetimeFigureOut">
               <a:rPr lang="de-DE" smtClean="0"/>
-              <a:t>04.05.2019</a:t>
+              <a:t>05.05.2019</a:t>
             </a:fld>
             <a:endParaRPr lang="de-DE"/>
           </a:p>
@@ -5999,7 +6663,7 @@
           <a:p>
             <a:fld id="{4E30C070-2E34-4C3A-B755-DD753BECDD85}" type="datetimeFigureOut">
               <a:rPr lang="de-DE" smtClean="0"/>
-              <a:t>04.05.2019</a:t>
+              <a:t>05.05.2019</a:t>
             </a:fld>
             <a:endParaRPr lang="de-DE"/>
           </a:p>
@@ -6411,7 +7075,7 @@
           <a:p>
             <a:fld id="{4E30C070-2E34-4C3A-B755-DD753BECDD85}" type="datetimeFigureOut">
               <a:rPr lang="de-DE" smtClean="0"/>
-              <a:t>04.05.2019</a:t>
+              <a:t>05.05.2019</a:t>
             </a:fld>
             <a:endParaRPr lang="de-DE"/>
           </a:p>
@@ -6552,7 +7216,7 @@
           <a:p>
             <a:fld id="{4E30C070-2E34-4C3A-B755-DD753BECDD85}" type="datetimeFigureOut">
               <a:rPr lang="de-DE" smtClean="0"/>
-              <a:t>04.05.2019</a:t>
+              <a:t>05.05.2019</a:t>
             </a:fld>
             <a:endParaRPr lang="de-DE"/>
           </a:p>
@@ -6665,7 +7329,7 @@
           <a:p>
             <a:fld id="{4E30C070-2E34-4C3A-B755-DD753BECDD85}" type="datetimeFigureOut">
               <a:rPr lang="de-DE" smtClean="0"/>
-              <a:t>04.05.2019</a:t>
+              <a:t>05.05.2019</a:t>
             </a:fld>
             <a:endParaRPr lang="de-DE"/>
           </a:p>
@@ -6976,7 +7640,7 @@
           <a:p>
             <a:fld id="{4E30C070-2E34-4C3A-B755-DD753BECDD85}" type="datetimeFigureOut">
               <a:rPr lang="de-DE" smtClean="0"/>
-              <a:t>04.05.2019</a:t>
+              <a:t>05.05.2019</a:t>
             </a:fld>
             <a:endParaRPr lang="de-DE"/>
           </a:p>
@@ -7264,7 +7928,7 @@
           <a:p>
             <a:fld id="{4E30C070-2E34-4C3A-B755-DD753BECDD85}" type="datetimeFigureOut">
               <a:rPr lang="de-DE" smtClean="0"/>
-              <a:t>04.05.2019</a:t>
+              <a:t>05.05.2019</a:t>
             </a:fld>
             <a:endParaRPr lang="de-DE"/>
           </a:p>
@@ -7505,7 +8169,7 @@
           <a:p>
             <a:fld id="{4E30C070-2E34-4C3A-B755-DD753BECDD85}" type="datetimeFigureOut">
               <a:rPr lang="de-DE" smtClean="0"/>
-              <a:t>04.05.2019</a:t>
+              <a:t>05.05.2019</a:t>
             </a:fld>
             <a:endParaRPr lang="de-DE"/>
           </a:p>
@@ -8127,7 +8791,7 @@
             <p:ph idx="1"/>
             <p:extLst>
               <p:ext uri="{D42A27DB-BD31-4B8C-83A1-F6EECF244321}">
-                <p14:modId xmlns:p14="http://schemas.microsoft.com/office/powerpoint/2010/main" val="77543178"/>
+                <p14:modId xmlns:p14="http://schemas.microsoft.com/office/powerpoint/2010/main" val="302724189"/>
               </p:ext>
             </p:extLst>
           </p:nvPr>

</xml_diff>